<commit_message>
Aula de JavaScript 26/01/2017
</commit_message>
<xml_diff>
--- a/javascript.pptx
+++ b/javascript.pptx
@@ -5,7 +5,7 @@
     <p:sldMasterId id="2147483648" r:id="rId1"/>
   </p:sldMasterIdLst>
   <p:notesMasterIdLst>
-    <p:notesMasterId r:id="rId48"/>
+    <p:notesMasterId r:id="rId62"/>
   </p:notesMasterIdLst>
   <p:sldIdLst>
     <p:sldId id="280" r:id="rId2"/>
@@ -54,6 +54,20 @@
     <p:sldId id="527" r:id="rId45"/>
     <p:sldId id="529" r:id="rId46"/>
     <p:sldId id="530" r:id="rId47"/>
+    <p:sldId id="531" r:id="rId48"/>
+    <p:sldId id="532" r:id="rId49"/>
+    <p:sldId id="533" r:id="rId50"/>
+    <p:sldId id="534" r:id="rId51"/>
+    <p:sldId id="535" r:id="rId52"/>
+    <p:sldId id="536" r:id="rId53"/>
+    <p:sldId id="537" r:id="rId54"/>
+    <p:sldId id="538" r:id="rId55"/>
+    <p:sldId id="539" r:id="rId56"/>
+    <p:sldId id="540" r:id="rId57"/>
+    <p:sldId id="541" r:id="rId58"/>
+    <p:sldId id="542" r:id="rId59"/>
+    <p:sldId id="543" r:id="rId60"/>
+    <p:sldId id="544" r:id="rId61"/>
   </p:sldIdLst>
   <p:sldSz cx="9144000" cy="6858000" type="screen4x3"/>
   <p:notesSz cx="6858000" cy="9144000"/>
@@ -253,7 +267,7 @@
           <a:p>
             <a:fld id="{E269A805-E56F-40E0-909D-63BC75B91D7C}" type="datetimeFigureOut">
               <a:rPr lang="pt-BR" smtClean="0"/>
-              <a:t>23/01/2017</a:t>
+              <a:t>26/01/2017</a:t>
             </a:fld>
             <a:endParaRPr lang="pt-BR"/>
           </a:p>
@@ -701,7 +715,7 @@
           <a:p>
             <a:fld id="{BACD0F14-2550-4514-8424-28681BE00D9C}" type="datetime1">
               <a:rPr lang="en-US" smtClean="0"/>
-              <a:t>1/23/2017</a:t>
+              <a:t>1/26/2017</a:t>
             </a:fld>
             <a:endParaRPr lang="en-US"/>
           </a:p>
@@ -868,7 +882,7 @@
           <a:p>
             <a:fld id="{6A3E330E-D03E-4934-96B9-5F2992C34C77}" type="datetime1">
               <a:rPr lang="en-US" smtClean="0"/>
-              <a:t>1/23/2017</a:t>
+              <a:t>1/26/2017</a:t>
             </a:fld>
             <a:endParaRPr lang="en-US"/>
           </a:p>
@@ -1045,7 +1059,7 @@
           <a:p>
             <a:fld id="{3631BDE0-4EA4-4115-B6AE-DB1F5C130EAF}" type="datetime1">
               <a:rPr lang="en-US" smtClean="0"/>
-              <a:t>1/23/2017</a:t>
+              <a:t>1/26/2017</a:t>
             </a:fld>
             <a:endParaRPr lang="en-US"/>
           </a:p>
@@ -1212,7 +1226,7 @@
           <a:p>
             <a:fld id="{5078FE44-8D3E-4093-8DFC-68F1ABE2F2C8}" type="datetime1">
               <a:rPr lang="en-US" smtClean="0"/>
-              <a:t>1/23/2017</a:t>
+              <a:t>1/26/2017</a:t>
             </a:fld>
             <a:endParaRPr lang="en-US"/>
           </a:p>
@@ -1455,7 +1469,7 @@
           <a:p>
             <a:fld id="{33C81573-B9DE-470D-861A-4CD0441F9AFB}" type="datetime1">
               <a:rPr lang="en-US" smtClean="0"/>
-              <a:t>1/23/2017</a:t>
+              <a:t>1/26/2017</a:t>
             </a:fld>
             <a:endParaRPr lang="en-US"/>
           </a:p>
@@ -1740,7 +1754,7 @@
           <a:p>
             <a:fld id="{3260883B-BD50-47A1-A331-1192965D650E}" type="datetime1">
               <a:rPr lang="en-US" smtClean="0"/>
-              <a:t>1/23/2017</a:t>
+              <a:t>1/26/2017</a:t>
             </a:fld>
             <a:endParaRPr lang="en-US"/>
           </a:p>
@@ -2159,7 +2173,7 @@
           <a:p>
             <a:fld id="{85C14137-89A7-4A68-B899-2BE83CD25941}" type="datetime1">
               <a:rPr lang="en-US" smtClean="0"/>
-              <a:t>1/23/2017</a:t>
+              <a:t>1/26/2017</a:t>
             </a:fld>
             <a:endParaRPr lang="en-US"/>
           </a:p>
@@ -2274,7 +2288,7 @@
           <a:p>
             <a:fld id="{4C03E1FC-9CFB-415D-A48E-63292E455116}" type="datetime1">
               <a:rPr lang="en-US" smtClean="0"/>
-              <a:t>1/23/2017</a:t>
+              <a:t>1/26/2017</a:t>
             </a:fld>
             <a:endParaRPr lang="en-US"/>
           </a:p>
@@ -2366,7 +2380,7 @@
           <a:p>
             <a:fld id="{AADB1548-2A9A-4465-B5E7-10E53CE67B23}" type="datetime1">
               <a:rPr lang="en-US" smtClean="0"/>
-              <a:t>1/23/2017</a:t>
+              <a:t>1/26/2017</a:t>
             </a:fld>
             <a:endParaRPr lang="en-US"/>
           </a:p>
@@ -2640,7 +2654,7 @@
           <a:p>
             <a:fld id="{A6BD4DA6-C04B-46E8-B8F8-717D2E056B86}" type="datetime1">
               <a:rPr lang="en-US" smtClean="0"/>
-              <a:t>1/23/2017</a:t>
+              <a:t>1/26/2017</a:t>
             </a:fld>
             <a:endParaRPr lang="en-US"/>
           </a:p>
@@ -2894,7 +2908,7 @@
           <a:p>
             <a:fld id="{0418ED8C-A5D6-493E-BC7D-87DB1586F690}" type="datetime1">
               <a:rPr lang="en-US" smtClean="0"/>
-              <a:t>1/23/2017</a:t>
+              <a:t>1/26/2017</a:t>
             </a:fld>
             <a:endParaRPr lang="en-US"/>
           </a:p>
@@ -3113,7 +3127,7 @@
           <a:p>
             <a:fld id="{E06F9A69-4ABD-46C7-A55E-F80AA81DDCDD}" type="datetime1">
               <a:rPr lang="en-US" smtClean="0"/>
-              <a:t>1/23/2017</a:t>
+              <a:t>1/26/2017</a:t>
             </a:fld>
             <a:endParaRPr lang="en-US"/>
           </a:p>
@@ -3746,7 +3760,7 @@
                 <a:latin typeface="Gulim" pitchFamily="34" charset="-127"/>
                 <a:ea typeface="Gulim" pitchFamily="34" charset="-127"/>
               </a:rPr>
-              <a:t> - MG, 23/01/2017</a:t>
+              <a:t> - MG, 26/01/2017</a:t>
             </a:r>
             <a:endParaRPr lang="pt-BR" sz="2300" dirty="0">
               <a:latin typeface="Gulim" pitchFamily="34" charset="-127"/>
@@ -15592,7 +15606,7 @@
 </p:sld>
 </file>
 
-<file path=ppt/slides/slide5.xml><?xml version="1.0" encoding="utf-8"?>
+<file path=ppt/slides/slide47.xml><?xml version="1.0" encoding="utf-8"?>
 <p:sld xmlns:a="http://schemas.openxmlformats.org/drawingml/2006/main" xmlns:r="http://schemas.openxmlformats.org/officeDocument/2006/relationships" xmlns:p="http://schemas.openxmlformats.org/presentationml/2006/main">
   <p:cSld>
     <p:spTree>
@@ -15632,54 +15646,14 @@
           <a:lstStyle/>
           <a:p>
             <a:r>
-              <a:rPr lang="en-US" sz="3600" dirty="0">
-                <a:solidFill>
-                  <a:srgbClr val="00B0F0"/>
-                </a:solidFill>
-                <a:latin typeface="Adobe Heiti Std R" pitchFamily="34" charset="-128"/>
-                <a:ea typeface="Adobe Heiti Std R" pitchFamily="34" charset="-128"/>
-              </a:rPr>
-              <a:t>O </a:t>
-            </a:r>
-            <a:r>
-              <a:rPr lang="en-US" sz="3600" dirty="0" err="1">
-                <a:solidFill>
-                  <a:srgbClr val="00B0F0"/>
-                </a:solidFill>
-                <a:latin typeface="Adobe Heiti Std R" pitchFamily="34" charset="-128"/>
-                <a:ea typeface="Adobe Heiti Std R" pitchFamily="34" charset="-128"/>
-              </a:rPr>
-              <a:t>que</a:t>
-            </a:r>
-            <a:r>
-              <a:rPr lang="en-US" sz="3600" dirty="0">
-                <a:solidFill>
-                  <a:srgbClr val="00B0F0"/>
-                </a:solidFill>
-                <a:latin typeface="Adobe Heiti Std R" pitchFamily="34" charset="-128"/>
-                <a:ea typeface="Adobe Heiti Std R" pitchFamily="34" charset="-128"/>
-              </a:rPr>
-              <a:t> é </a:t>
-            </a:r>
-            <a:r>
-              <a:rPr lang="en-US" sz="3600" dirty="0" err="1">
-                <a:solidFill>
-                  <a:srgbClr val="00B0F0"/>
-                </a:solidFill>
-                <a:latin typeface="Adobe Heiti Std R" pitchFamily="34" charset="-128"/>
-                <a:ea typeface="Adobe Heiti Std R" pitchFamily="34" charset="-128"/>
-              </a:rPr>
-              <a:t>Javascript</a:t>
-            </a:r>
-            <a:r>
-              <a:rPr lang="en-US" sz="3600" dirty="0">
-                <a:solidFill>
-                  <a:srgbClr val="00B0F0"/>
-                </a:solidFill>
-                <a:latin typeface="Adobe Heiti Std R" pitchFamily="34" charset="-128"/>
-                <a:ea typeface="Adobe Heiti Std R" pitchFamily="34" charset="-128"/>
-              </a:rPr>
-              <a:t> </a:t>
+              <a:rPr lang="en-US" sz="3600" dirty="0" err="1" smtClean="0">
+                <a:solidFill>
+                  <a:srgbClr val="00B0F0"/>
+                </a:solidFill>
+                <a:latin typeface="Adobe Heiti Std R" pitchFamily="34" charset="-128"/>
+                <a:ea typeface="Adobe Heiti Std R" pitchFamily="34" charset="-128"/>
+              </a:rPr>
+              <a:t>Estrutura</a:t>
             </a:r>
             <a:r>
               <a:rPr lang="en-US" sz="3600" dirty="0" smtClean="0">
@@ -15689,7 +15663,27 @@
                 <a:latin typeface="Adobe Heiti Std R" pitchFamily="34" charset="-128"/>
                 <a:ea typeface="Adobe Heiti Std R" pitchFamily="34" charset="-128"/>
               </a:rPr>
-              <a:t>(4)? </a:t>
+              <a:t> da </a:t>
+            </a:r>
+            <a:r>
+              <a:rPr lang="en-US" sz="3600" dirty="0" err="1" smtClean="0">
+                <a:solidFill>
+                  <a:srgbClr val="00B0F0"/>
+                </a:solidFill>
+                <a:latin typeface="Adobe Heiti Std R" pitchFamily="34" charset="-128"/>
+                <a:ea typeface="Adobe Heiti Std R" pitchFamily="34" charset="-128"/>
+              </a:rPr>
+              <a:t>linguagem</a:t>
+            </a:r>
+            <a:r>
+              <a:rPr lang="en-US" sz="3600" dirty="0" smtClean="0">
+                <a:solidFill>
+                  <a:srgbClr val="00B0F0"/>
+                </a:solidFill>
+                <a:latin typeface="Adobe Heiti Std R" pitchFamily="34" charset="-128"/>
+                <a:ea typeface="Adobe Heiti Std R" pitchFamily="34" charset="-128"/>
+              </a:rPr>
+              <a:t> (25) </a:t>
             </a:r>
             <a:endParaRPr lang="en-US" sz="3600" dirty="0">
               <a:solidFill>
@@ -15727,7 +15721,7 @@
                   <a:schemeClr val="bg1"/>
                 </a:solidFill>
               </a:rPr>
-              <a:t>4</a:t>
+              <a:t>46</a:t>
             </a:r>
             <a:endParaRPr lang="en-US" sz="1800" dirty="0">
               <a:solidFill>
@@ -15799,6 +15793,943 @@
       </p:pic>
       <p:sp>
         <p:nvSpPr>
+          <p:cNvPr id="3" name="Espaço Reservado para Conteúdo 2"/>
+          <p:cNvSpPr>
+            <a:spLocks noGrp="1"/>
+          </p:cNvSpPr>
+          <p:nvPr>
+            <p:ph idx="1"/>
+          </p:nvPr>
+        </p:nvSpPr>
+        <p:spPr/>
+        <p:txBody>
+          <a:bodyPr/>
+          <a:lstStyle/>
+          <a:p>
+            <a:endParaRPr lang="en-US" dirty="0" smtClean="0"/>
+          </a:p>
+          <a:p>
+            <a:endParaRPr lang="en-US" dirty="0"/>
+          </a:p>
+          <a:p>
+            <a:endParaRPr lang="en-US" dirty="0" smtClean="0"/>
+          </a:p>
+          <a:p>
+            <a:endParaRPr lang="en-US" dirty="0"/>
+          </a:p>
+          <a:p>
+            <a:endParaRPr lang="en-US" dirty="0" smtClean="0"/>
+          </a:p>
+        </p:txBody>
+      </p:sp>
+      <p:pic>
+        <p:nvPicPr>
+          <p:cNvPr id="10" name="Imagem 9"/>
+          <p:cNvPicPr>
+            <a:picLocks noChangeAspect="1"/>
+          </p:cNvPicPr>
+          <p:nvPr/>
+        </p:nvPicPr>
+        <p:blipFill>
+          <a:blip r:embed="rId4">
+            <a:extLst>
+              <a:ext uri="{28A0092B-C50C-407E-A947-70E740481C1C}">
+                <a14:useLocalDpi xmlns:a14="http://schemas.microsoft.com/office/drawing/2010/main" val="0"/>
+              </a:ext>
+            </a:extLst>
+          </a:blip>
+          <a:stretch>
+            <a:fillRect/>
+          </a:stretch>
+        </p:blipFill>
+        <p:spPr>
+          <a:xfrm>
+            <a:off x="0" y="1226863"/>
+            <a:ext cx="9252520" cy="4899299"/>
+          </a:xfrm>
+          <a:prstGeom prst="rect">
+            <a:avLst/>
+          </a:prstGeom>
+        </p:spPr>
+      </p:pic>
+    </p:spTree>
+    <p:extLst>
+      <p:ext uri="{BB962C8B-B14F-4D97-AF65-F5344CB8AC3E}">
+        <p14:creationId xmlns:p14="http://schemas.microsoft.com/office/powerpoint/2010/main" val="3710890467"/>
+      </p:ext>
+    </p:extLst>
+  </p:cSld>
+  <p:clrMapOvr>
+    <a:masterClrMapping/>
+  </p:clrMapOvr>
+  <p:transition spd="slow"/>
+  <p:timing>
+    <p:tnLst>
+      <p:par>
+        <p:cTn id="1" dur="indefinite" restart="never" nodeType="tmRoot"/>
+      </p:par>
+    </p:tnLst>
+  </p:timing>
+</p:sld>
+</file>
+
+<file path=ppt/slides/slide48.xml><?xml version="1.0" encoding="utf-8"?>
+<p:sld xmlns:a="http://schemas.openxmlformats.org/drawingml/2006/main" xmlns:r="http://schemas.openxmlformats.org/officeDocument/2006/relationships" xmlns:p="http://schemas.openxmlformats.org/presentationml/2006/main">
+  <p:cSld>
+    <p:spTree>
+      <p:nvGrpSpPr>
+        <p:cNvPr id="1" name=""/>
+        <p:cNvGrpSpPr/>
+        <p:nvPr/>
+      </p:nvGrpSpPr>
+      <p:grpSpPr>
+        <a:xfrm>
+          <a:off x="0" y="0"/>
+          <a:ext cx="0" cy="0"/>
+          <a:chOff x="0" y="0"/>
+          <a:chExt cx="0" cy="0"/>
+        </a:xfrm>
+      </p:grpSpPr>
+      <p:sp>
+        <p:nvSpPr>
+          <p:cNvPr id="2" name="Title 1"/>
+          <p:cNvSpPr>
+            <a:spLocks noGrp="1"/>
+          </p:cNvSpPr>
+          <p:nvPr>
+            <p:ph type="title"/>
+          </p:nvPr>
+        </p:nvSpPr>
+        <p:spPr>
+          <a:xfrm>
+            <a:off x="107505" y="152400"/>
+            <a:ext cx="8894452" cy="914400"/>
+          </a:xfrm>
+        </p:spPr>
+        <p:txBody>
+          <a:bodyPr>
+            <a:normAutofit/>
+          </a:bodyPr>
+          <a:lstStyle/>
+          <a:p>
+            <a:r>
+              <a:rPr lang="en-US" sz="3600" dirty="0" err="1" smtClean="0">
+                <a:solidFill>
+                  <a:srgbClr val="00B0F0"/>
+                </a:solidFill>
+                <a:latin typeface="Adobe Heiti Std R" pitchFamily="34" charset="-128"/>
+                <a:ea typeface="Adobe Heiti Std R" pitchFamily="34" charset="-128"/>
+              </a:rPr>
+              <a:t>Estrutura</a:t>
+            </a:r>
+            <a:r>
+              <a:rPr lang="en-US" sz="3600" dirty="0" smtClean="0">
+                <a:solidFill>
+                  <a:srgbClr val="00B0F0"/>
+                </a:solidFill>
+                <a:latin typeface="Adobe Heiti Std R" pitchFamily="34" charset="-128"/>
+                <a:ea typeface="Adobe Heiti Std R" pitchFamily="34" charset="-128"/>
+              </a:rPr>
+              <a:t> da </a:t>
+            </a:r>
+            <a:r>
+              <a:rPr lang="en-US" sz="3600" dirty="0" err="1" smtClean="0">
+                <a:solidFill>
+                  <a:srgbClr val="00B0F0"/>
+                </a:solidFill>
+                <a:latin typeface="Adobe Heiti Std R" pitchFamily="34" charset="-128"/>
+                <a:ea typeface="Adobe Heiti Std R" pitchFamily="34" charset="-128"/>
+              </a:rPr>
+              <a:t>linguagem</a:t>
+            </a:r>
+            <a:r>
+              <a:rPr lang="en-US" sz="3600" dirty="0" smtClean="0">
+                <a:solidFill>
+                  <a:srgbClr val="00B0F0"/>
+                </a:solidFill>
+                <a:latin typeface="Adobe Heiti Std R" pitchFamily="34" charset="-128"/>
+                <a:ea typeface="Adobe Heiti Std R" pitchFamily="34" charset="-128"/>
+              </a:rPr>
+              <a:t> (26) </a:t>
+            </a:r>
+            <a:endParaRPr lang="en-US" sz="3600" dirty="0">
+              <a:solidFill>
+                <a:srgbClr val="00B0F0"/>
+              </a:solidFill>
+              <a:latin typeface="Adobe Heiti Std R" pitchFamily="34" charset="-128"/>
+              <a:ea typeface="Adobe Heiti Std R" pitchFamily="34" charset="-128"/>
+            </a:endParaRPr>
+          </a:p>
+        </p:txBody>
+      </p:sp>
+      <p:sp>
+        <p:nvSpPr>
+          <p:cNvPr id="8" name="Espaço Reservado para Número de Slide 7"/>
+          <p:cNvSpPr>
+            <a:spLocks noGrp="1"/>
+          </p:cNvSpPr>
+          <p:nvPr>
+            <p:ph type="sldNum" sz="quarter" idx="12"/>
+          </p:nvPr>
+        </p:nvSpPr>
+        <p:spPr>
+          <a:xfrm>
+            <a:off x="6789060" y="6435906"/>
+            <a:ext cx="2133600" cy="365125"/>
+          </a:xfrm>
+        </p:spPr>
+        <p:txBody>
+          <a:bodyPr/>
+          <a:lstStyle/>
+          <a:p>
+            <a:r>
+              <a:rPr lang="en-US" sz="1800" dirty="0" smtClean="0">
+                <a:solidFill>
+                  <a:schemeClr val="bg1"/>
+                </a:solidFill>
+              </a:rPr>
+              <a:t>47</a:t>
+            </a:r>
+            <a:endParaRPr lang="en-US" sz="1800" dirty="0">
+              <a:solidFill>
+                <a:schemeClr val="bg1"/>
+              </a:solidFill>
+            </a:endParaRPr>
+          </a:p>
+        </p:txBody>
+      </p:sp>
+      <p:pic>
+        <p:nvPicPr>
+          <p:cNvPr id="7" name="Imagem 6"/>
+          <p:cNvPicPr>
+            <a:picLocks noChangeAspect="1"/>
+          </p:cNvPicPr>
+          <p:nvPr/>
+        </p:nvPicPr>
+        <p:blipFill>
+          <a:blip r:embed="rId2">
+            <a:extLst>
+              <a:ext uri="{28A0092B-C50C-407E-A947-70E740481C1C}">
+                <a14:useLocalDpi xmlns:a14="http://schemas.microsoft.com/office/drawing/2010/main" val="0"/>
+              </a:ext>
+            </a:extLst>
+          </a:blip>
+          <a:stretch>
+            <a:fillRect/>
+          </a:stretch>
+        </p:blipFill>
+        <p:spPr>
+          <a:xfrm>
+            <a:off x="-1044624" y="937217"/>
+            <a:ext cx="11089232" cy="502920"/>
+          </a:xfrm>
+          <a:prstGeom prst="rect">
+            <a:avLst/>
+          </a:prstGeom>
+        </p:spPr>
+      </p:pic>
+      <p:pic>
+        <p:nvPicPr>
+          <p:cNvPr id="6" name="Imagem 5"/>
+          <p:cNvPicPr>
+            <a:picLocks noChangeAspect="1"/>
+          </p:cNvPicPr>
+          <p:nvPr/>
+        </p:nvPicPr>
+        <p:blipFill>
+          <a:blip r:embed="rId3" cstate="print">
+            <a:extLst>
+              <a:ext uri="{28A0092B-C50C-407E-A947-70E740481C1C}">
+                <a14:useLocalDpi xmlns:a14="http://schemas.microsoft.com/office/drawing/2010/main" val="0"/>
+              </a:ext>
+            </a:extLst>
+          </a:blip>
+          <a:stretch>
+            <a:fillRect/>
+          </a:stretch>
+        </p:blipFill>
+        <p:spPr>
+          <a:xfrm>
+            <a:off x="266653" y="107704"/>
+            <a:ext cx="560931" cy="762614"/>
+          </a:xfrm>
+          <a:prstGeom prst="rect">
+            <a:avLst/>
+          </a:prstGeom>
+        </p:spPr>
+      </p:pic>
+      <p:sp>
+        <p:nvSpPr>
+          <p:cNvPr id="3" name="Espaço Reservado para Conteúdo 2"/>
+          <p:cNvSpPr>
+            <a:spLocks noGrp="1"/>
+          </p:cNvSpPr>
+          <p:nvPr>
+            <p:ph idx="1"/>
+          </p:nvPr>
+        </p:nvSpPr>
+        <p:spPr/>
+        <p:txBody>
+          <a:bodyPr/>
+          <a:lstStyle/>
+          <a:p>
+            <a:endParaRPr lang="en-US" dirty="0" smtClean="0"/>
+          </a:p>
+          <a:p>
+            <a:endParaRPr lang="en-US" dirty="0"/>
+          </a:p>
+          <a:p>
+            <a:endParaRPr lang="en-US" dirty="0" smtClean="0"/>
+          </a:p>
+          <a:p>
+            <a:endParaRPr lang="en-US" dirty="0"/>
+          </a:p>
+          <a:p>
+            <a:endParaRPr lang="en-US" dirty="0" smtClean="0"/>
+          </a:p>
+        </p:txBody>
+      </p:sp>
+      <p:pic>
+        <p:nvPicPr>
+          <p:cNvPr id="4" name="Imagem 3"/>
+          <p:cNvPicPr>
+            <a:picLocks noChangeAspect="1"/>
+          </p:cNvPicPr>
+          <p:nvPr/>
+        </p:nvPicPr>
+        <p:blipFill>
+          <a:blip r:embed="rId4"/>
+          <a:stretch>
+            <a:fillRect/>
+          </a:stretch>
+        </p:blipFill>
+        <p:spPr>
+          <a:xfrm>
+            <a:off x="0" y="1242737"/>
+            <a:ext cx="9172575" cy="2695284"/>
+          </a:xfrm>
+          <a:prstGeom prst="rect">
+            <a:avLst/>
+          </a:prstGeom>
+        </p:spPr>
+      </p:pic>
+      <p:sp>
+        <p:nvSpPr>
+          <p:cNvPr id="5" name="CaixaDeTexto 4"/>
+          <p:cNvSpPr txBox="1"/>
+          <p:nvPr/>
+        </p:nvSpPr>
+        <p:spPr>
+          <a:xfrm>
+            <a:off x="4499992" y="3733652"/>
+            <a:ext cx="2088232" cy="523220"/>
+          </a:xfrm>
+          <a:prstGeom prst="rect">
+            <a:avLst/>
+          </a:prstGeom>
+          <a:noFill/>
+        </p:spPr>
+        <p:txBody>
+          <a:bodyPr wrap="square" rtlCol="0">
+            <a:spAutoFit/>
+          </a:bodyPr>
+          <a:lstStyle/>
+          <a:p>
+            <a:r>
+              <a:rPr lang="en-US" sz="2800" dirty="0" smtClean="0"/>
+              <a:t>Ou:</a:t>
+            </a:r>
+            <a:endParaRPr lang="pt-BR" sz="2800" dirty="0"/>
+          </a:p>
+        </p:txBody>
+      </p:sp>
+      <p:pic>
+        <p:nvPicPr>
+          <p:cNvPr id="9" name="Imagem 8"/>
+          <p:cNvPicPr>
+            <a:picLocks noChangeAspect="1"/>
+          </p:cNvPicPr>
+          <p:nvPr/>
+        </p:nvPicPr>
+        <p:blipFill>
+          <a:blip r:embed="rId5"/>
+          <a:stretch>
+            <a:fillRect/>
+          </a:stretch>
+        </p:blipFill>
+        <p:spPr>
+          <a:xfrm>
+            <a:off x="-30671" y="4155791"/>
+            <a:ext cx="9124950" cy="1970371"/>
+          </a:xfrm>
+          <a:prstGeom prst="rect">
+            <a:avLst/>
+          </a:prstGeom>
+        </p:spPr>
+      </p:pic>
+    </p:spTree>
+    <p:extLst>
+      <p:ext uri="{BB962C8B-B14F-4D97-AF65-F5344CB8AC3E}">
+        <p14:creationId xmlns:p14="http://schemas.microsoft.com/office/powerpoint/2010/main" val="743918183"/>
+      </p:ext>
+    </p:extLst>
+  </p:cSld>
+  <p:clrMapOvr>
+    <a:masterClrMapping/>
+  </p:clrMapOvr>
+  <p:transition spd="slow"/>
+  <p:timing>
+    <p:tnLst>
+      <p:par>
+        <p:cTn id="1" dur="indefinite" restart="never" nodeType="tmRoot"/>
+      </p:par>
+    </p:tnLst>
+  </p:timing>
+</p:sld>
+</file>
+
+<file path=ppt/slides/slide49.xml><?xml version="1.0" encoding="utf-8"?>
+<p:sld xmlns:a="http://schemas.openxmlformats.org/drawingml/2006/main" xmlns:r="http://schemas.openxmlformats.org/officeDocument/2006/relationships" xmlns:p="http://schemas.openxmlformats.org/presentationml/2006/main">
+  <p:cSld>
+    <p:spTree>
+      <p:nvGrpSpPr>
+        <p:cNvPr id="1" name=""/>
+        <p:cNvGrpSpPr/>
+        <p:nvPr/>
+      </p:nvGrpSpPr>
+      <p:grpSpPr>
+        <a:xfrm>
+          <a:off x="0" y="0"/>
+          <a:ext cx="0" cy="0"/>
+          <a:chOff x="0" y="0"/>
+          <a:chExt cx="0" cy="0"/>
+        </a:xfrm>
+      </p:grpSpPr>
+      <p:sp>
+        <p:nvSpPr>
+          <p:cNvPr id="2" name="Title 1"/>
+          <p:cNvSpPr>
+            <a:spLocks noGrp="1"/>
+          </p:cNvSpPr>
+          <p:nvPr>
+            <p:ph type="title"/>
+          </p:nvPr>
+        </p:nvSpPr>
+        <p:spPr>
+          <a:xfrm>
+            <a:off x="107505" y="152400"/>
+            <a:ext cx="8894452" cy="914400"/>
+          </a:xfrm>
+        </p:spPr>
+        <p:txBody>
+          <a:bodyPr>
+            <a:normAutofit/>
+          </a:bodyPr>
+          <a:lstStyle/>
+          <a:p>
+            <a:r>
+              <a:rPr lang="en-US" sz="3600" dirty="0" err="1" smtClean="0">
+                <a:solidFill>
+                  <a:srgbClr val="00B0F0"/>
+                </a:solidFill>
+                <a:latin typeface="Adobe Heiti Std R" pitchFamily="34" charset="-128"/>
+                <a:ea typeface="Adobe Heiti Std R" pitchFamily="34" charset="-128"/>
+              </a:rPr>
+              <a:t>Estrutura</a:t>
+            </a:r>
+            <a:r>
+              <a:rPr lang="en-US" sz="3600" dirty="0" smtClean="0">
+                <a:solidFill>
+                  <a:srgbClr val="00B0F0"/>
+                </a:solidFill>
+                <a:latin typeface="Adobe Heiti Std R" pitchFamily="34" charset="-128"/>
+                <a:ea typeface="Adobe Heiti Std R" pitchFamily="34" charset="-128"/>
+              </a:rPr>
+              <a:t> da </a:t>
+            </a:r>
+            <a:r>
+              <a:rPr lang="en-US" sz="3600" dirty="0" err="1" smtClean="0">
+                <a:solidFill>
+                  <a:srgbClr val="00B0F0"/>
+                </a:solidFill>
+                <a:latin typeface="Adobe Heiti Std R" pitchFamily="34" charset="-128"/>
+                <a:ea typeface="Adobe Heiti Std R" pitchFamily="34" charset="-128"/>
+              </a:rPr>
+              <a:t>linguagem</a:t>
+            </a:r>
+            <a:r>
+              <a:rPr lang="en-US" sz="3600" dirty="0" smtClean="0">
+                <a:solidFill>
+                  <a:srgbClr val="00B0F0"/>
+                </a:solidFill>
+                <a:latin typeface="Adobe Heiti Std R" pitchFamily="34" charset="-128"/>
+                <a:ea typeface="Adobe Heiti Std R" pitchFamily="34" charset="-128"/>
+              </a:rPr>
+              <a:t> (27) </a:t>
+            </a:r>
+            <a:endParaRPr lang="en-US" sz="3600" dirty="0">
+              <a:solidFill>
+                <a:srgbClr val="00B0F0"/>
+              </a:solidFill>
+              <a:latin typeface="Adobe Heiti Std R" pitchFamily="34" charset="-128"/>
+              <a:ea typeface="Adobe Heiti Std R" pitchFamily="34" charset="-128"/>
+            </a:endParaRPr>
+          </a:p>
+        </p:txBody>
+      </p:sp>
+      <p:sp>
+        <p:nvSpPr>
+          <p:cNvPr id="8" name="Espaço Reservado para Número de Slide 7"/>
+          <p:cNvSpPr>
+            <a:spLocks noGrp="1"/>
+          </p:cNvSpPr>
+          <p:nvPr>
+            <p:ph type="sldNum" sz="quarter" idx="12"/>
+          </p:nvPr>
+        </p:nvSpPr>
+        <p:spPr>
+          <a:xfrm>
+            <a:off x="6789060" y="6435906"/>
+            <a:ext cx="2133600" cy="365125"/>
+          </a:xfrm>
+        </p:spPr>
+        <p:txBody>
+          <a:bodyPr/>
+          <a:lstStyle/>
+          <a:p>
+            <a:r>
+              <a:rPr lang="en-US" sz="1800" dirty="0" smtClean="0">
+                <a:solidFill>
+                  <a:schemeClr val="bg1"/>
+                </a:solidFill>
+              </a:rPr>
+              <a:t>48</a:t>
+            </a:r>
+            <a:endParaRPr lang="en-US" sz="1800" dirty="0">
+              <a:solidFill>
+                <a:schemeClr val="bg1"/>
+              </a:solidFill>
+            </a:endParaRPr>
+          </a:p>
+        </p:txBody>
+      </p:sp>
+      <p:pic>
+        <p:nvPicPr>
+          <p:cNvPr id="7" name="Imagem 6"/>
+          <p:cNvPicPr>
+            <a:picLocks noChangeAspect="1"/>
+          </p:cNvPicPr>
+          <p:nvPr/>
+        </p:nvPicPr>
+        <p:blipFill>
+          <a:blip r:embed="rId2">
+            <a:extLst>
+              <a:ext uri="{28A0092B-C50C-407E-A947-70E740481C1C}">
+                <a14:useLocalDpi xmlns:a14="http://schemas.microsoft.com/office/drawing/2010/main" val="0"/>
+              </a:ext>
+            </a:extLst>
+          </a:blip>
+          <a:stretch>
+            <a:fillRect/>
+          </a:stretch>
+        </p:blipFill>
+        <p:spPr>
+          <a:xfrm>
+            <a:off x="-1044624" y="787537"/>
+            <a:ext cx="11089232" cy="502920"/>
+          </a:xfrm>
+          <a:prstGeom prst="rect">
+            <a:avLst/>
+          </a:prstGeom>
+        </p:spPr>
+      </p:pic>
+      <p:pic>
+        <p:nvPicPr>
+          <p:cNvPr id="6" name="Imagem 5"/>
+          <p:cNvPicPr>
+            <a:picLocks noChangeAspect="1"/>
+          </p:cNvPicPr>
+          <p:nvPr/>
+        </p:nvPicPr>
+        <p:blipFill>
+          <a:blip r:embed="rId3" cstate="print">
+            <a:extLst>
+              <a:ext uri="{28A0092B-C50C-407E-A947-70E740481C1C}">
+                <a14:useLocalDpi xmlns:a14="http://schemas.microsoft.com/office/drawing/2010/main" val="0"/>
+              </a:ext>
+            </a:extLst>
+          </a:blip>
+          <a:stretch>
+            <a:fillRect/>
+          </a:stretch>
+        </p:blipFill>
+        <p:spPr>
+          <a:xfrm>
+            <a:off x="266653" y="107704"/>
+            <a:ext cx="560931" cy="762614"/>
+          </a:xfrm>
+          <a:prstGeom prst="rect">
+            <a:avLst/>
+          </a:prstGeom>
+        </p:spPr>
+      </p:pic>
+      <p:sp>
+        <p:nvSpPr>
+          <p:cNvPr id="3" name="Espaço Reservado para Conteúdo 2"/>
+          <p:cNvSpPr>
+            <a:spLocks noGrp="1"/>
+          </p:cNvSpPr>
+          <p:nvPr>
+            <p:ph idx="1"/>
+          </p:nvPr>
+        </p:nvSpPr>
+        <p:spPr/>
+        <p:txBody>
+          <a:bodyPr/>
+          <a:lstStyle/>
+          <a:p>
+            <a:endParaRPr lang="en-US" dirty="0" smtClean="0"/>
+          </a:p>
+          <a:p>
+            <a:endParaRPr lang="en-US" dirty="0"/>
+          </a:p>
+          <a:p>
+            <a:endParaRPr lang="en-US" dirty="0" smtClean="0"/>
+          </a:p>
+          <a:p>
+            <a:endParaRPr lang="en-US" dirty="0"/>
+          </a:p>
+          <a:p>
+            <a:endParaRPr lang="en-US" dirty="0" smtClean="0"/>
+          </a:p>
+        </p:txBody>
+      </p:sp>
+      <p:pic>
+        <p:nvPicPr>
+          <p:cNvPr id="10" name="Imagem 9"/>
+          <p:cNvPicPr>
+            <a:picLocks noChangeAspect="1"/>
+          </p:cNvPicPr>
+          <p:nvPr/>
+        </p:nvPicPr>
+        <p:blipFill>
+          <a:blip r:embed="rId4"/>
+          <a:stretch>
+            <a:fillRect/>
+          </a:stretch>
+        </p:blipFill>
+        <p:spPr>
+          <a:xfrm>
+            <a:off x="107505" y="1180061"/>
+            <a:ext cx="9036495" cy="4121147"/>
+          </a:xfrm>
+          <a:prstGeom prst="rect">
+            <a:avLst/>
+          </a:prstGeom>
+        </p:spPr>
+      </p:pic>
+      <p:sp>
+        <p:nvSpPr>
+          <p:cNvPr id="4" name="CaixaDeTexto 3"/>
+          <p:cNvSpPr txBox="1"/>
+          <p:nvPr/>
+        </p:nvSpPr>
+        <p:spPr>
+          <a:xfrm>
+            <a:off x="87748" y="5683891"/>
+            <a:ext cx="8815155" cy="400110"/>
+          </a:xfrm>
+          <a:prstGeom prst="rect">
+            <a:avLst/>
+          </a:prstGeom>
+          <a:noFill/>
+        </p:spPr>
+        <p:txBody>
+          <a:bodyPr wrap="square" rtlCol="0">
+            <a:spAutoFit/>
+          </a:bodyPr>
+          <a:lstStyle/>
+          <a:p>
+            <a:r>
+              <a:rPr lang="en-US" sz="2000" b="1" dirty="0" err="1" smtClean="0"/>
+              <a:t>Obs</a:t>
+            </a:r>
+            <a:r>
+              <a:rPr lang="en-US" sz="2000" b="1" dirty="0" smtClean="0"/>
+              <a:t>: </a:t>
+            </a:r>
+            <a:r>
+              <a:rPr lang="en-US" sz="2000" b="1" dirty="0" err="1" smtClean="0"/>
+              <a:t>Não</a:t>
+            </a:r>
+            <a:r>
+              <a:rPr lang="en-US" sz="2000" b="1" dirty="0" smtClean="0"/>
+              <a:t> </a:t>
+            </a:r>
+            <a:r>
+              <a:rPr lang="en-US" sz="2000" b="1" dirty="0" err="1" smtClean="0"/>
+              <a:t>existem</a:t>
+            </a:r>
+            <a:r>
+              <a:rPr lang="en-US" sz="2000" b="1" dirty="0" smtClean="0"/>
+              <a:t> </a:t>
+            </a:r>
+            <a:r>
+              <a:rPr lang="en-US" sz="2000" b="1" dirty="0" err="1" smtClean="0"/>
+              <a:t>métodos</a:t>
+            </a:r>
+            <a:r>
+              <a:rPr lang="en-US" sz="2000" b="1" dirty="0" smtClean="0"/>
+              <a:t>, </a:t>
+            </a:r>
+            <a:r>
+              <a:rPr lang="en-US" sz="2000" b="1" dirty="0" err="1" smtClean="0"/>
+              <a:t>apenas</a:t>
+            </a:r>
+            <a:r>
+              <a:rPr lang="en-US" sz="2000" b="1" dirty="0" smtClean="0"/>
+              <a:t> </a:t>
+            </a:r>
+            <a:r>
+              <a:rPr lang="en-US" sz="2000" b="1" dirty="0" err="1" smtClean="0"/>
+              <a:t>propriedades</a:t>
+            </a:r>
+            <a:r>
+              <a:rPr lang="en-US" sz="2000" b="1" dirty="0" smtClean="0"/>
+              <a:t>. </a:t>
+            </a:r>
+            <a:endParaRPr lang="pt-BR" sz="2000" b="1" dirty="0"/>
+          </a:p>
+        </p:txBody>
+      </p:sp>
+    </p:spTree>
+    <p:extLst>
+      <p:ext uri="{BB962C8B-B14F-4D97-AF65-F5344CB8AC3E}">
+        <p14:creationId xmlns:p14="http://schemas.microsoft.com/office/powerpoint/2010/main" val="3139098003"/>
+      </p:ext>
+    </p:extLst>
+  </p:cSld>
+  <p:clrMapOvr>
+    <a:masterClrMapping/>
+  </p:clrMapOvr>
+  <p:transition spd="slow"/>
+  <p:timing>
+    <p:tnLst>
+      <p:par>
+        <p:cTn id="1" dur="indefinite" restart="never" nodeType="tmRoot"/>
+      </p:par>
+    </p:tnLst>
+  </p:timing>
+</p:sld>
+</file>
+
+<file path=ppt/slides/slide5.xml><?xml version="1.0" encoding="utf-8"?>
+<p:sld xmlns:a="http://schemas.openxmlformats.org/drawingml/2006/main" xmlns:r="http://schemas.openxmlformats.org/officeDocument/2006/relationships" xmlns:p="http://schemas.openxmlformats.org/presentationml/2006/main">
+  <p:cSld>
+    <p:spTree>
+      <p:nvGrpSpPr>
+        <p:cNvPr id="1" name=""/>
+        <p:cNvGrpSpPr/>
+        <p:nvPr/>
+      </p:nvGrpSpPr>
+      <p:grpSpPr>
+        <a:xfrm>
+          <a:off x="0" y="0"/>
+          <a:ext cx="0" cy="0"/>
+          <a:chOff x="0" y="0"/>
+          <a:chExt cx="0" cy="0"/>
+        </a:xfrm>
+      </p:grpSpPr>
+      <p:sp>
+        <p:nvSpPr>
+          <p:cNvPr id="2" name="Title 1"/>
+          <p:cNvSpPr>
+            <a:spLocks noGrp="1"/>
+          </p:cNvSpPr>
+          <p:nvPr>
+            <p:ph type="title"/>
+          </p:nvPr>
+        </p:nvSpPr>
+        <p:spPr>
+          <a:xfrm>
+            <a:off x="107505" y="152400"/>
+            <a:ext cx="8894452" cy="914400"/>
+          </a:xfrm>
+        </p:spPr>
+        <p:txBody>
+          <a:bodyPr>
+            <a:normAutofit/>
+          </a:bodyPr>
+          <a:lstStyle/>
+          <a:p>
+            <a:r>
+              <a:rPr lang="en-US" sz="3600" dirty="0">
+                <a:solidFill>
+                  <a:srgbClr val="00B0F0"/>
+                </a:solidFill>
+                <a:latin typeface="Adobe Heiti Std R" pitchFamily="34" charset="-128"/>
+                <a:ea typeface="Adobe Heiti Std R" pitchFamily="34" charset="-128"/>
+              </a:rPr>
+              <a:t>O </a:t>
+            </a:r>
+            <a:r>
+              <a:rPr lang="en-US" sz="3600" dirty="0" err="1">
+                <a:solidFill>
+                  <a:srgbClr val="00B0F0"/>
+                </a:solidFill>
+                <a:latin typeface="Adobe Heiti Std R" pitchFamily="34" charset="-128"/>
+                <a:ea typeface="Adobe Heiti Std R" pitchFamily="34" charset="-128"/>
+              </a:rPr>
+              <a:t>que</a:t>
+            </a:r>
+            <a:r>
+              <a:rPr lang="en-US" sz="3600" dirty="0">
+                <a:solidFill>
+                  <a:srgbClr val="00B0F0"/>
+                </a:solidFill>
+                <a:latin typeface="Adobe Heiti Std R" pitchFamily="34" charset="-128"/>
+                <a:ea typeface="Adobe Heiti Std R" pitchFamily="34" charset="-128"/>
+              </a:rPr>
+              <a:t> é </a:t>
+            </a:r>
+            <a:r>
+              <a:rPr lang="en-US" sz="3600" dirty="0" err="1">
+                <a:solidFill>
+                  <a:srgbClr val="00B0F0"/>
+                </a:solidFill>
+                <a:latin typeface="Adobe Heiti Std R" pitchFamily="34" charset="-128"/>
+                <a:ea typeface="Adobe Heiti Std R" pitchFamily="34" charset="-128"/>
+              </a:rPr>
+              <a:t>Javascript</a:t>
+            </a:r>
+            <a:r>
+              <a:rPr lang="en-US" sz="3600" dirty="0">
+                <a:solidFill>
+                  <a:srgbClr val="00B0F0"/>
+                </a:solidFill>
+                <a:latin typeface="Adobe Heiti Std R" pitchFamily="34" charset="-128"/>
+                <a:ea typeface="Adobe Heiti Std R" pitchFamily="34" charset="-128"/>
+              </a:rPr>
+              <a:t> </a:t>
+            </a:r>
+            <a:r>
+              <a:rPr lang="en-US" sz="3600" dirty="0" smtClean="0">
+                <a:solidFill>
+                  <a:srgbClr val="00B0F0"/>
+                </a:solidFill>
+                <a:latin typeface="Adobe Heiti Std R" pitchFamily="34" charset="-128"/>
+                <a:ea typeface="Adobe Heiti Std R" pitchFamily="34" charset="-128"/>
+              </a:rPr>
+              <a:t>(4)? </a:t>
+            </a:r>
+            <a:endParaRPr lang="en-US" sz="3600" dirty="0">
+              <a:solidFill>
+                <a:srgbClr val="00B0F0"/>
+              </a:solidFill>
+              <a:latin typeface="Adobe Heiti Std R" pitchFamily="34" charset="-128"/>
+              <a:ea typeface="Adobe Heiti Std R" pitchFamily="34" charset="-128"/>
+            </a:endParaRPr>
+          </a:p>
+        </p:txBody>
+      </p:sp>
+      <p:sp>
+        <p:nvSpPr>
+          <p:cNvPr id="8" name="Espaço Reservado para Número de Slide 7"/>
+          <p:cNvSpPr>
+            <a:spLocks noGrp="1"/>
+          </p:cNvSpPr>
+          <p:nvPr>
+            <p:ph type="sldNum" sz="quarter" idx="12"/>
+          </p:nvPr>
+        </p:nvSpPr>
+        <p:spPr>
+          <a:xfrm>
+            <a:off x="6789060" y="6435906"/>
+            <a:ext cx="2133600" cy="365125"/>
+          </a:xfrm>
+        </p:spPr>
+        <p:txBody>
+          <a:bodyPr/>
+          <a:lstStyle/>
+          <a:p>
+            <a:r>
+              <a:rPr lang="en-US" sz="1800" dirty="0" smtClean="0">
+                <a:solidFill>
+                  <a:schemeClr val="bg1"/>
+                </a:solidFill>
+              </a:rPr>
+              <a:t>4</a:t>
+            </a:r>
+            <a:endParaRPr lang="en-US" sz="1800" dirty="0">
+              <a:solidFill>
+                <a:schemeClr val="bg1"/>
+              </a:solidFill>
+            </a:endParaRPr>
+          </a:p>
+        </p:txBody>
+      </p:sp>
+      <p:pic>
+        <p:nvPicPr>
+          <p:cNvPr id="7" name="Imagem 6"/>
+          <p:cNvPicPr>
+            <a:picLocks noChangeAspect="1"/>
+          </p:cNvPicPr>
+          <p:nvPr/>
+        </p:nvPicPr>
+        <p:blipFill>
+          <a:blip r:embed="rId2">
+            <a:extLst>
+              <a:ext uri="{28A0092B-C50C-407E-A947-70E740481C1C}">
+                <a14:useLocalDpi xmlns:a14="http://schemas.microsoft.com/office/drawing/2010/main" val="0"/>
+              </a:ext>
+            </a:extLst>
+          </a:blip>
+          <a:stretch>
+            <a:fillRect/>
+          </a:stretch>
+        </p:blipFill>
+        <p:spPr>
+          <a:xfrm>
+            <a:off x="-1044624" y="937217"/>
+            <a:ext cx="11089232" cy="502920"/>
+          </a:xfrm>
+          <a:prstGeom prst="rect">
+            <a:avLst/>
+          </a:prstGeom>
+        </p:spPr>
+      </p:pic>
+      <p:pic>
+        <p:nvPicPr>
+          <p:cNvPr id="6" name="Imagem 5"/>
+          <p:cNvPicPr>
+            <a:picLocks noChangeAspect="1"/>
+          </p:cNvPicPr>
+          <p:nvPr/>
+        </p:nvPicPr>
+        <p:blipFill>
+          <a:blip r:embed="rId3" cstate="print">
+            <a:extLst>
+              <a:ext uri="{28A0092B-C50C-407E-A947-70E740481C1C}">
+                <a14:useLocalDpi xmlns:a14="http://schemas.microsoft.com/office/drawing/2010/main" val="0"/>
+              </a:ext>
+            </a:extLst>
+          </a:blip>
+          <a:stretch>
+            <a:fillRect/>
+          </a:stretch>
+        </p:blipFill>
+        <p:spPr>
+          <a:xfrm>
+            <a:off x="266653" y="107704"/>
+            <a:ext cx="560931" cy="762614"/>
+          </a:xfrm>
+          <a:prstGeom prst="rect">
+            <a:avLst/>
+          </a:prstGeom>
+        </p:spPr>
+      </p:pic>
+      <p:sp>
+        <p:nvSpPr>
           <p:cNvPr id="5" name="Espaço Reservado para Conteúdo 4"/>
           <p:cNvSpPr>
             <a:spLocks noGrp="1"/>
@@ -15844,6 +16775,3274 @@
     <p:extLst>
       <p:ext uri="{BB962C8B-B14F-4D97-AF65-F5344CB8AC3E}">
         <p14:creationId xmlns:p14="http://schemas.microsoft.com/office/powerpoint/2010/main" val="15684826"/>
+      </p:ext>
+    </p:extLst>
+  </p:cSld>
+  <p:clrMapOvr>
+    <a:masterClrMapping/>
+  </p:clrMapOvr>
+  <p:transition spd="slow"/>
+  <p:timing>
+    <p:tnLst>
+      <p:par>
+        <p:cTn id="1" dur="indefinite" restart="never" nodeType="tmRoot"/>
+      </p:par>
+    </p:tnLst>
+  </p:timing>
+</p:sld>
+</file>
+
+<file path=ppt/slides/slide50.xml><?xml version="1.0" encoding="utf-8"?>
+<p:sld xmlns:a="http://schemas.openxmlformats.org/drawingml/2006/main" xmlns:r="http://schemas.openxmlformats.org/officeDocument/2006/relationships" xmlns:p="http://schemas.openxmlformats.org/presentationml/2006/main">
+  <p:cSld>
+    <p:spTree>
+      <p:nvGrpSpPr>
+        <p:cNvPr id="1" name=""/>
+        <p:cNvGrpSpPr/>
+        <p:nvPr/>
+      </p:nvGrpSpPr>
+      <p:grpSpPr>
+        <a:xfrm>
+          <a:off x="0" y="0"/>
+          <a:ext cx="0" cy="0"/>
+          <a:chOff x="0" y="0"/>
+          <a:chExt cx="0" cy="0"/>
+        </a:xfrm>
+      </p:grpSpPr>
+      <p:sp>
+        <p:nvSpPr>
+          <p:cNvPr id="2" name="Title 1"/>
+          <p:cNvSpPr>
+            <a:spLocks noGrp="1"/>
+          </p:cNvSpPr>
+          <p:nvPr>
+            <p:ph type="title"/>
+          </p:nvPr>
+        </p:nvSpPr>
+        <p:spPr>
+          <a:xfrm>
+            <a:off x="107505" y="152400"/>
+            <a:ext cx="8894452" cy="914400"/>
+          </a:xfrm>
+        </p:spPr>
+        <p:txBody>
+          <a:bodyPr>
+            <a:normAutofit/>
+          </a:bodyPr>
+          <a:lstStyle/>
+          <a:p>
+            <a:r>
+              <a:rPr lang="en-US" sz="3600" dirty="0" err="1" smtClean="0">
+                <a:solidFill>
+                  <a:srgbClr val="00B0F0"/>
+                </a:solidFill>
+                <a:latin typeface="Adobe Heiti Std R" pitchFamily="34" charset="-128"/>
+                <a:ea typeface="Adobe Heiti Std R" pitchFamily="34" charset="-128"/>
+              </a:rPr>
+              <a:t>Estrutura</a:t>
+            </a:r>
+            <a:r>
+              <a:rPr lang="en-US" sz="3600" dirty="0" smtClean="0">
+                <a:solidFill>
+                  <a:srgbClr val="00B0F0"/>
+                </a:solidFill>
+                <a:latin typeface="Adobe Heiti Std R" pitchFamily="34" charset="-128"/>
+                <a:ea typeface="Adobe Heiti Std R" pitchFamily="34" charset="-128"/>
+              </a:rPr>
+              <a:t> da </a:t>
+            </a:r>
+            <a:r>
+              <a:rPr lang="en-US" sz="3600" dirty="0" err="1" smtClean="0">
+                <a:solidFill>
+                  <a:srgbClr val="00B0F0"/>
+                </a:solidFill>
+                <a:latin typeface="Adobe Heiti Std R" pitchFamily="34" charset="-128"/>
+                <a:ea typeface="Adobe Heiti Std R" pitchFamily="34" charset="-128"/>
+              </a:rPr>
+              <a:t>linguagem</a:t>
+            </a:r>
+            <a:r>
+              <a:rPr lang="en-US" sz="3600" dirty="0" smtClean="0">
+                <a:solidFill>
+                  <a:srgbClr val="00B0F0"/>
+                </a:solidFill>
+                <a:latin typeface="Adobe Heiti Std R" pitchFamily="34" charset="-128"/>
+                <a:ea typeface="Adobe Heiti Std R" pitchFamily="34" charset="-128"/>
+              </a:rPr>
+              <a:t> (28) </a:t>
+            </a:r>
+            <a:endParaRPr lang="en-US" sz="3600" dirty="0">
+              <a:solidFill>
+                <a:srgbClr val="00B0F0"/>
+              </a:solidFill>
+              <a:latin typeface="Adobe Heiti Std R" pitchFamily="34" charset="-128"/>
+              <a:ea typeface="Adobe Heiti Std R" pitchFamily="34" charset="-128"/>
+            </a:endParaRPr>
+          </a:p>
+        </p:txBody>
+      </p:sp>
+      <p:sp>
+        <p:nvSpPr>
+          <p:cNvPr id="8" name="Espaço Reservado para Número de Slide 7"/>
+          <p:cNvSpPr>
+            <a:spLocks noGrp="1"/>
+          </p:cNvSpPr>
+          <p:nvPr>
+            <p:ph type="sldNum" sz="quarter" idx="12"/>
+          </p:nvPr>
+        </p:nvSpPr>
+        <p:spPr>
+          <a:xfrm>
+            <a:off x="6789060" y="6435906"/>
+            <a:ext cx="2133600" cy="365125"/>
+          </a:xfrm>
+        </p:spPr>
+        <p:txBody>
+          <a:bodyPr/>
+          <a:lstStyle/>
+          <a:p>
+            <a:r>
+              <a:rPr lang="en-US" sz="1800" dirty="0" smtClean="0">
+                <a:solidFill>
+                  <a:schemeClr val="bg1"/>
+                </a:solidFill>
+              </a:rPr>
+              <a:t>49</a:t>
+            </a:r>
+            <a:endParaRPr lang="en-US" sz="1800" dirty="0">
+              <a:solidFill>
+                <a:schemeClr val="bg1"/>
+              </a:solidFill>
+            </a:endParaRPr>
+          </a:p>
+        </p:txBody>
+      </p:sp>
+      <p:pic>
+        <p:nvPicPr>
+          <p:cNvPr id="7" name="Imagem 6"/>
+          <p:cNvPicPr>
+            <a:picLocks noChangeAspect="1"/>
+          </p:cNvPicPr>
+          <p:nvPr/>
+        </p:nvPicPr>
+        <p:blipFill>
+          <a:blip r:embed="rId2">
+            <a:extLst>
+              <a:ext uri="{28A0092B-C50C-407E-A947-70E740481C1C}">
+                <a14:useLocalDpi xmlns:a14="http://schemas.microsoft.com/office/drawing/2010/main" val="0"/>
+              </a:ext>
+            </a:extLst>
+          </a:blip>
+          <a:stretch>
+            <a:fillRect/>
+          </a:stretch>
+        </p:blipFill>
+        <p:spPr>
+          <a:xfrm>
+            <a:off x="-1044624" y="937217"/>
+            <a:ext cx="11089232" cy="502920"/>
+          </a:xfrm>
+          <a:prstGeom prst="rect">
+            <a:avLst/>
+          </a:prstGeom>
+        </p:spPr>
+      </p:pic>
+      <p:pic>
+        <p:nvPicPr>
+          <p:cNvPr id="6" name="Imagem 5"/>
+          <p:cNvPicPr>
+            <a:picLocks noChangeAspect="1"/>
+          </p:cNvPicPr>
+          <p:nvPr/>
+        </p:nvPicPr>
+        <p:blipFill>
+          <a:blip r:embed="rId3" cstate="print">
+            <a:extLst>
+              <a:ext uri="{28A0092B-C50C-407E-A947-70E740481C1C}">
+                <a14:useLocalDpi xmlns:a14="http://schemas.microsoft.com/office/drawing/2010/main" val="0"/>
+              </a:ext>
+            </a:extLst>
+          </a:blip>
+          <a:stretch>
+            <a:fillRect/>
+          </a:stretch>
+        </p:blipFill>
+        <p:spPr>
+          <a:xfrm>
+            <a:off x="266653" y="107704"/>
+            <a:ext cx="560931" cy="762614"/>
+          </a:xfrm>
+          <a:prstGeom prst="rect">
+            <a:avLst/>
+          </a:prstGeom>
+        </p:spPr>
+      </p:pic>
+      <p:sp>
+        <p:nvSpPr>
+          <p:cNvPr id="3" name="Espaço Reservado para Conteúdo 2"/>
+          <p:cNvSpPr>
+            <a:spLocks noGrp="1"/>
+          </p:cNvSpPr>
+          <p:nvPr>
+            <p:ph idx="1"/>
+          </p:nvPr>
+        </p:nvSpPr>
+        <p:spPr/>
+        <p:txBody>
+          <a:bodyPr/>
+          <a:lstStyle/>
+          <a:p>
+            <a:endParaRPr lang="en-US" dirty="0" smtClean="0"/>
+          </a:p>
+          <a:p>
+            <a:endParaRPr lang="en-US" dirty="0"/>
+          </a:p>
+          <a:p>
+            <a:endParaRPr lang="en-US" dirty="0" smtClean="0"/>
+          </a:p>
+          <a:p>
+            <a:endParaRPr lang="en-US" dirty="0"/>
+          </a:p>
+          <a:p>
+            <a:endParaRPr lang="en-US" dirty="0" smtClean="0"/>
+          </a:p>
+        </p:txBody>
+      </p:sp>
+      <p:sp>
+        <p:nvSpPr>
+          <p:cNvPr id="4" name="CaixaDeTexto 3"/>
+          <p:cNvSpPr txBox="1"/>
+          <p:nvPr/>
+        </p:nvSpPr>
+        <p:spPr>
+          <a:xfrm>
+            <a:off x="457200" y="1600200"/>
+            <a:ext cx="8003232" cy="1077218"/>
+          </a:xfrm>
+          <a:prstGeom prst="rect">
+            <a:avLst/>
+          </a:prstGeom>
+          <a:noFill/>
+        </p:spPr>
+        <p:txBody>
+          <a:bodyPr wrap="square" rtlCol="0">
+            <a:spAutoFit/>
+          </a:bodyPr>
+          <a:lstStyle/>
+          <a:p>
+            <a:r>
+              <a:rPr lang="en-US" sz="3200" dirty="0" err="1" smtClean="0"/>
+              <a:t>Qual</a:t>
+            </a:r>
+            <a:r>
+              <a:rPr lang="en-US" sz="3200" dirty="0" smtClean="0"/>
+              <a:t> a </a:t>
+            </a:r>
+            <a:r>
+              <a:rPr lang="en-US" sz="3200" dirty="0" err="1" smtClean="0"/>
+              <a:t>outra</a:t>
+            </a:r>
+            <a:r>
+              <a:rPr lang="en-US" sz="3200" dirty="0" smtClean="0"/>
+              <a:t> forma de </a:t>
+            </a:r>
+            <a:r>
+              <a:rPr lang="en-US" sz="3200" dirty="0" err="1" smtClean="0"/>
+              <a:t>criar</a:t>
+            </a:r>
+            <a:r>
+              <a:rPr lang="en-US" sz="3200" dirty="0" smtClean="0"/>
+              <a:t> o </a:t>
+            </a:r>
+            <a:r>
+              <a:rPr lang="en-US" sz="3200" dirty="0" err="1" smtClean="0"/>
+              <a:t>objeto</a:t>
+            </a:r>
+            <a:r>
+              <a:rPr lang="en-US" sz="3200" dirty="0" smtClean="0"/>
+              <a:t> </a:t>
+            </a:r>
+            <a:r>
+              <a:rPr lang="en-US" sz="3200" dirty="0" err="1" smtClean="0"/>
+              <a:t>raphael</a:t>
+            </a:r>
+            <a:r>
+              <a:rPr lang="en-US" sz="3200" dirty="0" smtClean="0"/>
+              <a:t> no Slide anterior? </a:t>
+            </a:r>
+            <a:r>
+              <a:rPr lang="en-US" sz="3200" dirty="0" err="1" smtClean="0"/>
+              <a:t>Façam</a:t>
+            </a:r>
+            <a:r>
+              <a:rPr lang="en-US" sz="3200" dirty="0" smtClean="0"/>
+              <a:t>!</a:t>
+            </a:r>
+            <a:endParaRPr lang="pt-BR" sz="3200" dirty="0"/>
+          </a:p>
+        </p:txBody>
+      </p:sp>
+    </p:spTree>
+    <p:extLst>
+      <p:ext uri="{BB962C8B-B14F-4D97-AF65-F5344CB8AC3E}">
+        <p14:creationId xmlns:p14="http://schemas.microsoft.com/office/powerpoint/2010/main" val="2165093951"/>
+      </p:ext>
+    </p:extLst>
+  </p:cSld>
+  <p:clrMapOvr>
+    <a:masterClrMapping/>
+  </p:clrMapOvr>
+  <p:transition spd="slow"/>
+  <p:timing>
+    <p:tnLst>
+      <p:par>
+        <p:cTn id="1" dur="indefinite" restart="never" nodeType="tmRoot"/>
+      </p:par>
+    </p:tnLst>
+  </p:timing>
+</p:sld>
+</file>
+
+<file path=ppt/slides/slide51.xml><?xml version="1.0" encoding="utf-8"?>
+<p:sld xmlns:a="http://schemas.openxmlformats.org/drawingml/2006/main" xmlns:r="http://schemas.openxmlformats.org/officeDocument/2006/relationships" xmlns:p="http://schemas.openxmlformats.org/presentationml/2006/main">
+  <p:cSld>
+    <p:spTree>
+      <p:nvGrpSpPr>
+        <p:cNvPr id="1" name=""/>
+        <p:cNvGrpSpPr/>
+        <p:nvPr/>
+      </p:nvGrpSpPr>
+      <p:grpSpPr>
+        <a:xfrm>
+          <a:off x="0" y="0"/>
+          <a:ext cx="0" cy="0"/>
+          <a:chOff x="0" y="0"/>
+          <a:chExt cx="0" cy="0"/>
+        </a:xfrm>
+      </p:grpSpPr>
+      <p:sp>
+        <p:nvSpPr>
+          <p:cNvPr id="2" name="Title 1"/>
+          <p:cNvSpPr>
+            <a:spLocks noGrp="1"/>
+          </p:cNvSpPr>
+          <p:nvPr>
+            <p:ph type="title"/>
+          </p:nvPr>
+        </p:nvSpPr>
+        <p:spPr>
+          <a:xfrm>
+            <a:off x="107505" y="152400"/>
+            <a:ext cx="8894452" cy="914400"/>
+          </a:xfrm>
+        </p:spPr>
+        <p:txBody>
+          <a:bodyPr>
+            <a:normAutofit/>
+          </a:bodyPr>
+          <a:lstStyle/>
+          <a:p>
+            <a:r>
+              <a:rPr lang="en-US" sz="3600" dirty="0" err="1" smtClean="0">
+                <a:solidFill>
+                  <a:srgbClr val="00B0F0"/>
+                </a:solidFill>
+                <a:latin typeface="Adobe Heiti Std R" pitchFamily="34" charset="-128"/>
+                <a:ea typeface="Adobe Heiti Std R" pitchFamily="34" charset="-128"/>
+              </a:rPr>
+              <a:t>Herança</a:t>
+            </a:r>
+            <a:r>
+              <a:rPr lang="en-US" sz="3600" dirty="0" smtClean="0">
+                <a:solidFill>
+                  <a:srgbClr val="00B0F0"/>
+                </a:solidFill>
+                <a:latin typeface="Adobe Heiti Std R" pitchFamily="34" charset="-128"/>
+                <a:ea typeface="Adobe Heiti Std R" pitchFamily="34" charset="-128"/>
+              </a:rPr>
+              <a:t> </a:t>
+            </a:r>
+            <a:r>
+              <a:rPr lang="en-US" sz="3600" dirty="0" err="1" smtClean="0">
+                <a:solidFill>
+                  <a:srgbClr val="00B0F0"/>
+                </a:solidFill>
+                <a:latin typeface="Adobe Heiti Std R" pitchFamily="34" charset="-128"/>
+                <a:ea typeface="Adobe Heiti Std R" pitchFamily="34" charset="-128"/>
+              </a:rPr>
+              <a:t>em</a:t>
+            </a:r>
+            <a:r>
+              <a:rPr lang="en-US" sz="3600" dirty="0" smtClean="0">
+                <a:solidFill>
+                  <a:srgbClr val="00B0F0"/>
+                </a:solidFill>
+                <a:latin typeface="Adobe Heiti Std R" pitchFamily="34" charset="-128"/>
+                <a:ea typeface="Adobe Heiti Std R" pitchFamily="34" charset="-128"/>
+              </a:rPr>
+              <a:t> </a:t>
+            </a:r>
+            <a:r>
+              <a:rPr lang="en-US" sz="3600" dirty="0" err="1" smtClean="0">
+                <a:solidFill>
+                  <a:srgbClr val="00B0F0"/>
+                </a:solidFill>
+                <a:latin typeface="Adobe Heiti Std R" pitchFamily="34" charset="-128"/>
+                <a:ea typeface="Adobe Heiti Std R" pitchFamily="34" charset="-128"/>
+              </a:rPr>
+              <a:t>Javascript</a:t>
+            </a:r>
+            <a:r>
+              <a:rPr lang="en-US" sz="3600" dirty="0" smtClean="0">
+                <a:solidFill>
+                  <a:srgbClr val="00B0F0"/>
+                </a:solidFill>
+                <a:latin typeface="Adobe Heiti Std R" pitchFamily="34" charset="-128"/>
+                <a:ea typeface="Adobe Heiti Std R" pitchFamily="34" charset="-128"/>
+              </a:rPr>
+              <a:t> (1) </a:t>
+            </a:r>
+            <a:endParaRPr lang="en-US" sz="3600" dirty="0">
+              <a:solidFill>
+                <a:srgbClr val="00B0F0"/>
+              </a:solidFill>
+              <a:latin typeface="Adobe Heiti Std R" pitchFamily="34" charset="-128"/>
+              <a:ea typeface="Adobe Heiti Std R" pitchFamily="34" charset="-128"/>
+            </a:endParaRPr>
+          </a:p>
+        </p:txBody>
+      </p:sp>
+      <p:sp>
+        <p:nvSpPr>
+          <p:cNvPr id="8" name="Espaço Reservado para Número de Slide 7"/>
+          <p:cNvSpPr>
+            <a:spLocks noGrp="1"/>
+          </p:cNvSpPr>
+          <p:nvPr>
+            <p:ph type="sldNum" sz="quarter" idx="12"/>
+          </p:nvPr>
+        </p:nvSpPr>
+        <p:spPr>
+          <a:xfrm>
+            <a:off x="6789060" y="6435906"/>
+            <a:ext cx="2133600" cy="365125"/>
+          </a:xfrm>
+        </p:spPr>
+        <p:txBody>
+          <a:bodyPr/>
+          <a:lstStyle/>
+          <a:p>
+            <a:r>
+              <a:rPr lang="en-US" sz="1800" dirty="0" smtClean="0">
+                <a:solidFill>
+                  <a:schemeClr val="bg1"/>
+                </a:solidFill>
+              </a:rPr>
+              <a:t>50</a:t>
+            </a:r>
+            <a:endParaRPr lang="en-US" sz="1800" dirty="0">
+              <a:solidFill>
+                <a:schemeClr val="bg1"/>
+              </a:solidFill>
+            </a:endParaRPr>
+          </a:p>
+        </p:txBody>
+      </p:sp>
+      <p:pic>
+        <p:nvPicPr>
+          <p:cNvPr id="7" name="Imagem 6"/>
+          <p:cNvPicPr>
+            <a:picLocks noChangeAspect="1"/>
+          </p:cNvPicPr>
+          <p:nvPr/>
+        </p:nvPicPr>
+        <p:blipFill>
+          <a:blip r:embed="rId2">
+            <a:extLst>
+              <a:ext uri="{28A0092B-C50C-407E-A947-70E740481C1C}">
+                <a14:useLocalDpi xmlns:a14="http://schemas.microsoft.com/office/drawing/2010/main" val="0"/>
+              </a:ext>
+            </a:extLst>
+          </a:blip>
+          <a:stretch>
+            <a:fillRect/>
+          </a:stretch>
+        </p:blipFill>
+        <p:spPr>
+          <a:xfrm>
+            <a:off x="-1044624" y="937217"/>
+            <a:ext cx="11089232" cy="502920"/>
+          </a:xfrm>
+          <a:prstGeom prst="rect">
+            <a:avLst/>
+          </a:prstGeom>
+        </p:spPr>
+      </p:pic>
+      <p:pic>
+        <p:nvPicPr>
+          <p:cNvPr id="6" name="Imagem 5"/>
+          <p:cNvPicPr>
+            <a:picLocks noChangeAspect="1"/>
+          </p:cNvPicPr>
+          <p:nvPr/>
+        </p:nvPicPr>
+        <p:blipFill>
+          <a:blip r:embed="rId3" cstate="print">
+            <a:extLst>
+              <a:ext uri="{28A0092B-C50C-407E-A947-70E740481C1C}">
+                <a14:useLocalDpi xmlns:a14="http://schemas.microsoft.com/office/drawing/2010/main" val="0"/>
+              </a:ext>
+            </a:extLst>
+          </a:blip>
+          <a:stretch>
+            <a:fillRect/>
+          </a:stretch>
+        </p:blipFill>
+        <p:spPr>
+          <a:xfrm>
+            <a:off x="266653" y="107704"/>
+            <a:ext cx="560931" cy="762614"/>
+          </a:xfrm>
+          <a:prstGeom prst="rect">
+            <a:avLst/>
+          </a:prstGeom>
+        </p:spPr>
+      </p:pic>
+      <p:sp>
+        <p:nvSpPr>
+          <p:cNvPr id="3" name="Espaço Reservado para Conteúdo 2"/>
+          <p:cNvSpPr>
+            <a:spLocks noGrp="1"/>
+          </p:cNvSpPr>
+          <p:nvPr>
+            <p:ph idx="1"/>
+          </p:nvPr>
+        </p:nvSpPr>
+        <p:spPr/>
+        <p:txBody>
+          <a:bodyPr/>
+          <a:lstStyle/>
+          <a:p>
+            <a:endParaRPr lang="en-US" dirty="0" smtClean="0"/>
+          </a:p>
+          <a:p>
+            <a:endParaRPr lang="en-US" dirty="0"/>
+          </a:p>
+          <a:p>
+            <a:endParaRPr lang="en-US" dirty="0" smtClean="0"/>
+          </a:p>
+          <a:p>
+            <a:endParaRPr lang="en-US" dirty="0"/>
+          </a:p>
+          <a:p>
+            <a:endParaRPr lang="en-US" dirty="0" smtClean="0"/>
+          </a:p>
+        </p:txBody>
+      </p:sp>
+      <p:pic>
+        <p:nvPicPr>
+          <p:cNvPr id="5" name="Imagem 4"/>
+          <p:cNvPicPr>
+            <a:picLocks noChangeAspect="1"/>
+          </p:cNvPicPr>
+          <p:nvPr/>
+        </p:nvPicPr>
+        <p:blipFill>
+          <a:blip r:embed="rId4"/>
+          <a:stretch>
+            <a:fillRect/>
+          </a:stretch>
+        </p:blipFill>
+        <p:spPr>
+          <a:xfrm>
+            <a:off x="107505" y="1277465"/>
+            <a:ext cx="9036495" cy="4917346"/>
+          </a:xfrm>
+          <a:prstGeom prst="rect">
+            <a:avLst/>
+          </a:prstGeom>
+        </p:spPr>
+      </p:pic>
+    </p:spTree>
+    <p:extLst>
+      <p:ext uri="{BB962C8B-B14F-4D97-AF65-F5344CB8AC3E}">
+        <p14:creationId xmlns:p14="http://schemas.microsoft.com/office/powerpoint/2010/main" val="1323702074"/>
+      </p:ext>
+    </p:extLst>
+  </p:cSld>
+  <p:clrMapOvr>
+    <a:masterClrMapping/>
+  </p:clrMapOvr>
+  <p:transition spd="slow"/>
+  <p:timing>
+    <p:tnLst>
+      <p:par>
+        <p:cTn id="1" dur="indefinite" restart="never" nodeType="tmRoot"/>
+      </p:par>
+    </p:tnLst>
+  </p:timing>
+</p:sld>
+</file>
+
+<file path=ppt/slides/slide52.xml><?xml version="1.0" encoding="utf-8"?>
+<p:sld xmlns:a="http://schemas.openxmlformats.org/drawingml/2006/main" xmlns:r="http://schemas.openxmlformats.org/officeDocument/2006/relationships" xmlns:p="http://schemas.openxmlformats.org/presentationml/2006/main">
+  <p:cSld>
+    <p:spTree>
+      <p:nvGrpSpPr>
+        <p:cNvPr id="1" name=""/>
+        <p:cNvGrpSpPr/>
+        <p:nvPr/>
+      </p:nvGrpSpPr>
+      <p:grpSpPr>
+        <a:xfrm>
+          <a:off x="0" y="0"/>
+          <a:ext cx="0" cy="0"/>
+          <a:chOff x="0" y="0"/>
+          <a:chExt cx="0" cy="0"/>
+        </a:xfrm>
+      </p:grpSpPr>
+      <p:sp>
+        <p:nvSpPr>
+          <p:cNvPr id="2" name="Title 1"/>
+          <p:cNvSpPr>
+            <a:spLocks noGrp="1"/>
+          </p:cNvSpPr>
+          <p:nvPr>
+            <p:ph type="title"/>
+          </p:nvPr>
+        </p:nvSpPr>
+        <p:spPr>
+          <a:xfrm>
+            <a:off x="107505" y="152400"/>
+            <a:ext cx="8894452" cy="914400"/>
+          </a:xfrm>
+        </p:spPr>
+        <p:txBody>
+          <a:bodyPr>
+            <a:normAutofit/>
+          </a:bodyPr>
+          <a:lstStyle/>
+          <a:p>
+            <a:r>
+              <a:rPr lang="en-US" sz="3600" dirty="0" err="1">
+                <a:solidFill>
+                  <a:srgbClr val="00B0F0"/>
+                </a:solidFill>
+                <a:latin typeface="Adobe Heiti Std R" pitchFamily="34" charset="-128"/>
+                <a:ea typeface="Adobe Heiti Std R" pitchFamily="34" charset="-128"/>
+              </a:rPr>
+              <a:t>Herança</a:t>
+            </a:r>
+            <a:r>
+              <a:rPr lang="en-US" sz="3600" dirty="0">
+                <a:solidFill>
+                  <a:srgbClr val="00B0F0"/>
+                </a:solidFill>
+                <a:latin typeface="Adobe Heiti Std R" pitchFamily="34" charset="-128"/>
+                <a:ea typeface="Adobe Heiti Std R" pitchFamily="34" charset="-128"/>
+              </a:rPr>
+              <a:t> </a:t>
+            </a:r>
+            <a:r>
+              <a:rPr lang="en-US" sz="3600" dirty="0" err="1">
+                <a:solidFill>
+                  <a:srgbClr val="00B0F0"/>
+                </a:solidFill>
+                <a:latin typeface="Adobe Heiti Std R" pitchFamily="34" charset="-128"/>
+                <a:ea typeface="Adobe Heiti Std R" pitchFamily="34" charset="-128"/>
+              </a:rPr>
+              <a:t>em</a:t>
+            </a:r>
+            <a:r>
+              <a:rPr lang="en-US" sz="3600" dirty="0">
+                <a:solidFill>
+                  <a:srgbClr val="00B0F0"/>
+                </a:solidFill>
+                <a:latin typeface="Adobe Heiti Std R" pitchFamily="34" charset="-128"/>
+                <a:ea typeface="Adobe Heiti Std R" pitchFamily="34" charset="-128"/>
+              </a:rPr>
+              <a:t> </a:t>
+            </a:r>
+            <a:r>
+              <a:rPr lang="en-US" sz="3600" dirty="0" err="1">
+                <a:solidFill>
+                  <a:srgbClr val="00B0F0"/>
+                </a:solidFill>
+                <a:latin typeface="Adobe Heiti Std R" pitchFamily="34" charset="-128"/>
+                <a:ea typeface="Adobe Heiti Std R" pitchFamily="34" charset="-128"/>
+              </a:rPr>
+              <a:t>Javascript</a:t>
+            </a:r>
+            <a:r>
+              <a:rPr lang="en-US" sz="3600" dirty="0">
+                <a:solidFill>
+                  <a:srgbClr val="00B0F0"/>
+                </a:solidFill>
+                <a:latin typeface="Adobe Heiti Std R" pitchFamily="34" charset="-128"/>
+                <a:ea typeface="Adobe Heiti Std R" pitchFamily="34" charset="-128"/>
+              </a:rPr>
+              <a:t> </a:t>
+            </a:r>
+            <a:r>
+              <a:rPr lang="en-US" sz="3600" dirty="0" smtClean="0">
+                <a:solidFill>
+                  <a:srgbClr val="00B0F0"/>
+                </a:solidFill>
+                <a:latin typeface="Adobe Heiti Std R" pitchFamily="34" charset="-128"/>
+                <a:ea typeface="Adobe Heiti Std R" pitchFamily="34" charset="-128"/>
+              </a:rPr>
+              <a:t>(2) </a:t>
+            </a:r>
+            <a:endParaRPr lang="en-US" sz="3600" dirty="0">
+              <a:solidFill>
+                <a:srgbClr val="00B0F0"/>
+              </a:solidFill>
+              <a:latin typeface="Adobe Heiti Std R" pitchFamily="34" charset="-128"/>
+              <a:ea typeface="Adobe Heiti Std R" pitchFamily="34" charset="-128"/>
+            </a:endParaRPr>
+          </a:p>
+        </p:txBody>
+      </p:sp>
+      <p:sp>
+        <p:nvSpPr>
+          <p:cNvPr id="8" name="Espaço Reservado para Número de Slide 7"/>
+          <p:cNvSpPr>
+            <a:spLocks noGrp="1"/>
+          </p:cNvSpPr>
+          <p:nvPr>
+            <p:ph type="sldNum" sz="quarter" idx="12"/>
+          </p:nvPr>
+        </p:nvSpPr>
+        <p:spPr>
+          <a:xfrm>
+            <a:off x="6789060" y="6435906"/>
+            <a:ext cx="2133600" cy="365125"/>
+          </a:xfrm>
+        </p:spPr>
+        <p:txBody>
+          <a:bodyPr/>
+          <a:lstStyle/>
+          <a:p>
+            <a:r>
+              <a:rPr lang="en-US" sz="1800" dirty="0" smtClean="0">
+                <a:solidFill>
+                  <a:schemeClr val="bg1"/>
+                </a:solidFill>
+              </a:rPr>
+              <a:t>51</a:t>
+            </a:r>
+            <a:endParaRPr lang="en-US" sz="1800" dirty="0">
+              <a:solidFill>
+                <a:schemeClr val="bg1"/>
+              </a:solidFill>
+            </a:endParaRPr>
+          </a:p>
+        </p:txBody>
+      </p:sp>
+      <p:pic>
+        <p:nvPicPr>
+          <p:cNvPr id="7" name="Imagem 6"/>
+          <p:cNvPicPr>
+            <a:picLocks noChangeAspect="1"/>
+          </p:cNvPicPr>
+          <p:nvPr/>
+        </p:nvPicPr>
+        <p:blipFill>
+          <a:blip r:embed="rId2">
+            <a:extLst>
+              <a:ext uri="{28A0092B-C50C-407E-A947-70E740481C1C}">
+                <a14:useLocalDpi xmlns:a14="http://schemas.microsoft.com/office/drawing/2010/main" val="0"/>
+              </a:ext>
+            </a:extLst>
+          </a:blip>
+          <a:stretch>
+            <a:fillRect/>
+          </a:stretch>
+        </p:blipFill>
+        <p:spPr>
+          <a:xfrm>
+            <a:off x="-1044624" y="937217"/>
+            <a:ext cx="11089232" cy="502920"/>
+          </a:xfrm>
+          <a:prstGeom prst="rect">
+            <a:avLst/>
+          </a:prstGeom>
+        </p:spPr>
+      </p:pic>
+      <p:pic>
+        <p:nvPicPr>
+          <p:cNvPr id="6" name="Imagem 5"/>
+          <p:cNvPicPr>
+            <a:picLocks noChangeAspect="1"/>
+          </p:cNvPicPr>
+          <p:nvPr/>
+        </p:nvPicPr>
+        <p:blipFill>
+          <a:blip r:embed="rId3" cstate="print">
+            <a:extLst>
+              <a:ext uri="{28A0092B-C50C-407E-A947-70E740481C1C}">
+                <a14:useLocalDpi xmlns:a14="http://schemas.microsoft.com/office/drawing/2010/main" val="0"/>
+              </a:ext>
+            </a:extLst>
+          </a:blip>
+          <a:stretch>
+            <a:fillRect/>
+          </a:stretch>
+        </p:blipFill>
+        <p:spPr>
+          <a:xfrm>
+            <a:off x="266653" y="107704"/>
+            <a:ext cx="560931" cy="762614"/>
+          </a:xfrm>
+          <a:prstGeom prst="rect">
+            <a:avLst/>
+          </a:prstGeom>
+        </p:spPr>
+      </p:pic>
+      <p:sp>
+        <p:nvSpPr>
+          <p:cNvPr id="3" name="Espaço Reservado para Conteúdo 2"/>
+          <p:cNvSpPr>
+            <a:spLocks noGrp="1"/>
+          </p:cNvSpPr>
+          <p:nvPr>
+            <p:ph idx="1"/>
+          </p:nvPr>
+        </p:nvSpPr>
+        <p:spPr/>
+        <p:txBody>
+          <a:bodyPr/>
+          <a:lstStyle/>
+          <a:p>
+            <a:endParaRPr lang="en-US" dirty="0" smtClean="0"/>
+          </a:p>
+          <a:p>
+            <a:endParaRPr lang="en-US" dirty="0"/>
+          </a:p>
+          <a:p>
+            <a:endParaRPr lang="en-US" dirty="0" smtClean="0"/>
+          </a:p>
+          <a:p>
+            <a:endParaRPr lang="en-US" dirty="0"/>
+          </a:p>
+          <a:p>
+            <a:endParaRPr lang="en-US" dirty="0" smtClean="0"/>
+          </a:p>
+        </p:txBody>
+      </p:sp>
+      <p:pic>
+        <p:nvPicPr>
+          <p:cNvPr id="4" name="Imagem 3"/>
+          <p:cNvPicPr>
+            <a:picLocks noChangeAspect="1"/>
+          </p:cNvPicPr>
+          <p:nvPr/>
+        </p:nvPicPr>
+        <p:blipFill>
+          <a:blip r:embed="rId4"/>
+          <a:stretch>
+            <a:fillRect/>
+          </a:stretch>
+        </p:blipFill>
+        <p:spPr>
+          <a:xfrm>
+            <a:off x="79298" y="1277465"/>
+            <a:ext cx="9064702" cy="4896661"/>
+          </a:xfrm>
+          <a:prstGeom prst="rect">
+            <a:avLst/>
+          </a:prstGeom>
+        </p:spPr>
+      </p:pic>
+    </p:spTree>
+    <p:extLst>
+      <p:ext uri="{BB962C8B-B14F-4D97-AF65-F5344CB8AC3E}">
+        <p14:creationId xmlns:p14="http://schemas.microsoft.com/office/powerpoint/2010/main" val="2402475220"/>
+      </p:ext>
+    </p:extLst>
+  </p:cSld>
+  <p:clrMapOvr>
+    <a:masterClrMapping/>
+  </p:clrMapOvr>
+  <p:transition spd="slow"/>
+  <p:timing>
+    <p:tnLst>
+      <p:par>
+        <p:cTn id="1" dur="indefinite" restart="never" nodeType="tmRoot"/>
+      </p:par>
+    </p:tnLst>
+  </p:timing>
+</p:sld>
+</file>
+
+<file path=ppt/slides/slide53.xml><?xml version="1.0" encoding="utf-8"?>
+<p:sld xmlns:a="http://schemas.openxmlformats.org/drawingml/2006/main" xmlns:r="http://schemas.openxmlformats.org/officeDocument/2006/relationships" xmlns:p="http://schemas.openxmlformats.org/presentationml/2006/main">
+  <p:cSld>
+    <p:spTree>
+      <p:nvGrpSpPr>
+        <p:cNvPr id="1" name=""/>
+        <p:cNvGrpSpPr/>
+        <p:nvPr/>
+      </p:nvGrpSpPr>
+      <p:grpSpPr>
+        <a:xfrm>
+          <a:off x="0" y="0"/>
+          <a:ext cx="0" cy="0"/>
+          <a:chOff x="0" y="0"/>
+          <a:chExt cx="0" cy="0"/>
+        </a:xfrm>
+      </p:grpSpPr>
+      <p:sp>
+        <p:nvSpPr>
+          <p:cNvPr id="2" name="Title 1"/>
+          <p:cNvSpPr>
+            <a:spLocks noGrp="1"/>
+          </p:cNvSpPr>
+          <p:nvPr>
+            <p:ph type="title"/>
+          </p:nvPr>
+        </p:nvSpPr>
+        <p:spPr>
+          <a:xfrm>
+            <a:off x="107505" y="152400"/>
+            <a:ext cx="8894452" cy="914400"/>
+          </a:xfrm>
+        </p:spPr>
+        <p:txBody>
+          <a:bodyPr>
+            <a:normAutofit/>
+          </a:bodyPr>
+          <a:lstStyle/>
+          <a:p>
+            <a:r>
+              <a:rPr lang="en-US" sz="3600" dirty="0" err="1">
+                <a:solidFill>
+                  <a:srgbClr val="00B0F0"/>
+                </a:solidFill>
+                <a:latin typeface="Adobe Heiti Std R" pitchFamily="34" charset="-128"/>
+                <a:ea typeface="Adobe Heiti Std R" pitchFamily="34" charset="-128"/>
+              </a:rPr>
+              <a:t>Herança</a:t>
+            </a:r>
+            <a:r>
+              <a:rPr lang="en-US" sz="3600" dirty="0">
+                <a:solidFill>
+                  <a:srgbClr val="00B0F0"/>
+                </a:solidFill>
+                <a:latin typeface="Adobe Heiti Std R" pitchFamily="34" charset="-128"/>
+                <a:ea typeface="Adobe Heiti Std R" pitchFamily="34" charset="-128"/>
+              </a:rPr>
+              <a:t> </a:t>
+            </a:r>
+            <a:r>
+              <a:rPr lang="en-US" sz="3600" dirty="0" err="1">
+                <a:solidFill>
+                  <a:srgbClr val="00B0F0"/>
+                </a:solidFill>
+                <a:latin typeface="Adobe Heiti Std R" pitchFamily="34" charset="-128"/>
+                <a:ea typeface="Adobe Heiti Std R" pitchFamily="34" charset="-128"/>
+              </a:rPr>
+              <a:t>em</a:t>
+            </a:r>
+            <a:r>
+              <a:rPr lang="en-US" sz="3600" dirty="0">
+                <a:solidFill>
+                  <a:srgbClr val="00B0F0"/>
+                </a:solidFill>
+                <a:latin typeface="Adobe Heiti Std R" pitchFamily="34" charset="-128"/>
+                <a:ea typeface="Adobe Heiti Std R" pitchFamily="34" charset="-128"/>
+              </a:rPr>
+              <a:t> </a:t>
+            </a:r>
+            <a:r>
+              <a:rPr lang="en-US" sz="3600" dirty="0" err="1">
+                <a:solidFill>
+                  <a:srgbClr val="00B0F0"/>
+                </a:solidFill>
+                <a:latin typeface="Adobe Heiti Std R" pitchFamily="34" charset="-128"/>
+                <a:ea typeface="Adobe Heiti Std R" pitchFamily="34" charset="-128"/>
+              </a:rPr>
+              <a:t>Javascript</a:t>
+            </a:r>
+            <a:r>
+              <a:rPr lang="en-US" sz="3600" dirty="0">
+                <a:solidFill>
+                  <a:srgbClr val="00B0F0"/>
+                </a:solidFill>
+                <a:latin typeface="Adobe Heiti Std R" pitchFamily="34" charset="-128"/>
+                <a:ea typeface="Adobe Heiti Std R" pitchFamily="34" charset="-128"/>
+              </a:rPr>
+              <a:t> </a:t>
+            </a:r>
+            <a:r>
+              <a:rPr lang="en-US" sz="3600" dirty="0" smtClean="0">
+                <a:solidFill>
+                  <a:srgbClr val="00B0F0"/>
+                </a:solidFill>
+                <a:latin typeface="Adobe Heiti Std R" pitchFamily="34" charset="-128"/>
+                <a:ea typeface="Adobe Heiti Std R" pitchFamily="34" charset="-128"/>
+              </a:rPr>
+              <a:t>(3)  </a:t>
+            </a:r>
+            <a:endParaRPr lang="en-US" sz="3600" dirty="0">
+              <a:solidFill>
+                <a:srgbClr val="00B0F0"/>
+              </a:solidFill>
+              <a:latin typeface="Adobe Heiti Std R" pitchFamily="34" charset="-128"/>
+              <a:ea typeface="Adobe Heiti Std R" pitchFamily="34" charset="-128"/>
+            </a:endParaRPr>
+          </a:p>
+        </p:txBody>
+      </p:sp>
+      <p:sp>
+        <p:nvSpPr>
+          <p:cNvPr id="8" name="Espaço Reservado para Número de Slide 7"/>
+          <p:cNvSpPr>
+            <a:spLocks noGrp="1"/>
+          </p:cNvSpPr>
+          <p:nvPr>
+            <p:ph type="sldNum" sz="quarter" idx="12"/>
+          </p:nvPr>
+        </p:nvSpPr>
+        <p:spPr>
+          <a:xfrm>
+            <a:off x="6789060" y="6435906"/>
+            <a:ext cx="2133600" cy="365125"/>
+          </a:xfrm>
+        </p:spPr>
+        <p:txBody>
+          <a:bodyPr/>
+          <a:lstStyle/>
+          <a:p>
+            <a:r>
+              <a:rPr lang="en-US" sz="1800" dirty="0" smtClean="0">
+                <a:solidFill>
+                  <a:schemeClr val="bg1"/>
+                </a:solidFill>
+              </a:rPr>
+              <a:t>52</a:t>
+            </a:r>
+            <a:endParaRPr lang="en-US" sz="1800" dirty="0">
+              <a:solidFill>
+                <a:schemeClr val="bg1"/>
+              </a:solidFill>
+            </a:endParaRPr>
+          </a:p>
+        </p:txBody>
+      </p:sp>
+      <p:pic>
+        <p:nvPicPr>
+          <p:cNvPr id="7" name="Imagem 6"/>
+          <p:cNvPicPr>
+            <a:picLocks noChangeAspect="1"/>
+          </p:cNvPicPr>
+          <p:nvPr/>
+        </p:nvPicPr>
+        <p:blipFill>
+          <a:blip r:embed="rId2">
+            <a:extLst>
+              <a:ext uri="{28A0092B-C50C-407E-A947-70E740481C1C}">
+                <a14:useLocalDpi xmlns:a14="http://schemas.microsoft.com/office/drawing/2010/main" val="0"/>
+              </a:ext>
+            </a:extLst>
+          </a:blip>
+          <a:stretch>
+            <a:fillRect/>
+          </a:stretch>
+        </p:blipFill>
+        <p:spPr>
+          <a:xfrm>
+            <a:off x="-1044624" y="937217"/>
+            <a:ext cx="11089232" cy="502920"/>
+          </a:xfrm>
+          <a:prstGeom prst="rect">
+            <a:avLst/>
+          </a:prstGeom>
+        </p:spPr>
+      </p:pic>
+      <p:pic>
+        <p:nvPicPr>
+          <p:cNvPr id="6" name="Imagem 5"/>
+          <p:cNvPicPr>
+            <a:picLocks noChangeAspect="1"/>
+          </p:cNvPicPr>
+          <p:nvPr/>
+        </p:nvPicPr>
+        <p:blipFill>
+          <a:blip r:embed="rId3" cstate="print">
+            <a:extLst>
+              <a:ext uri="{28A0092B-C50C-407E-A947-70E740481C1C}">
+                <a14:useLocalDpi xmlns:a14="http://schemas.microsoft.com/office/drawing/2010/main" val="0"/>
+              </a:ext>
+            </a:extLst>
+          </a:blip>
+          <a:stretch>
+            <a:fillRect/>
+          </a:stretch>
+        </p:blipFill>
+        <p:spPr>
+          <a:xfrm>
+            <a:off x="266653" y="107704"/>
+            <a:ext cx="560931" cy="762614"/>
+          </a:xfrm>
+          <a:prstGeom prst="rect">
+            <a:avLst/>
+          </a:prstGeom>
+        </p:spPr>
+      </p:pic>
+      <p:sp>
+        <p:nvSpPr>
+          <p:cNvPr id="3" name="Espaço Reservado para Conteúdo 2"/>
+          <p:cNvSpPr>
+            <a:spLocks noGrp="1"/>
+          </p:cNvSpPr>
+          <p:nvPr>
+            <p:ph idx="1"/>
+          </p:nvPr>
+        </p:nvSpPr>
+        <p:spPr/>
+        <p:txBody>
+          <a:bodyPr/>
+          <a:lstStyle/>
+          <a:p>
+            <a:endParaRPr lang="en-US" dirty="0" smtClean="0"/>
+          </a:p>
+          <a:p>
+            <a:endParaRPr lang="en-US" dirty="0"/>
+          </a:p>
+          <a:p>
+            <a:endParaRPr lang="en-US" dirty="0" smtClean="0"/>
+          </a:p>
+          <a:p>
+            <a:endParaRPr lang="en-US" dirty="0"/>
+          </a:p>
+          <a:p>
+            <a:endParaRPr lang="en-US" dirty="0" smtClean="0"/>
+          </a:p>
+        </p:txBody>
+      </p:sp>
+      <p:pic>
+        <p:nvPicPr>
+          <p:cNvPr id="5" name="Imagem 4"/>
+          <p:cNvPicPr>
+            <a:picLocks noChangeAspect="1"/>
+          </p:cNvPicPr>
+          <p:nvPr/>
+        </p:nvPicPr>
+        <p:blipFill>
+          <a:blip r:embed="rId4"/>
+          <a:stretch>
+            <a:fillRect/>
+          </a:stretch>
+        </p:blipFill>
+        <p:spPr>
+          <a:xfrm>
+            <a:off x="0" y="1238171"/>
+            <a:ext cx="9144000" cy="4943448"/>
+          </a:xfrm>
+          <a:prstGeom prst="rect">
+            <a:avLst/>
+          </a:prstGeom>
+        </p:spPr>
+      </p:pic>
+    </p:spTree>
+    <p:extLst>
+      <p:ext uri="{BB962C8B-B14F-4D97-AF65-F5344CB8AC3E}">
+        <p14:creationId xmlns:p14="http://schemas.microsoft.com/office/powerpoint/2010/main" val="3515361478"/>
+      </p:ext>
+    </p:extLst>
+  </p:cSld>
+  <p:clrMapOvr>
+    <a:masterClrMapping/>
+  </p:clrMapOvr>
+  <p:transition spd="slow"/>
+  <p:timing>
+    <p:tnLst>
+      <p:par>
+        <p:cTn id="1" dur="indefinite" restart="never" nodeType="tmRoot"/>
+      </p:par>
+    </p:tnLst>
+  </p:timing>
+</p:sld>
+</file>
+
+<file path=ppt/slides/slide54.xml><?xml version="1.0" encoding="utf-8"?>
+<p:sld xmlns:a="http://schemas.openxmlformats.org/drawingml/2006/main" xmlns:r="http://schemas.openxmlformats.org/officeDocument/2006/relationships" xmlns:p="http://schemas.openxmlformats.org/presentationml/2006/main">
+  <p:cSld>
+    <p:spTree>
+      <p:nvGrpSpPr>
+        <p:cNvPr id="1" name=""/>
+        <p:cNvGrpSpPr/>
+        <p:nvPr/>
+      </p:nvGrpSpPr>
+      <p:grpSpPr>
+        <a:xfrm>
+          <a:off x="0" y="0"/>
+          <a:ext cx="0" cy="0"/>
+          <a:chOff x="0" y="0"/>
+          <a:chExt cx="0" cy="0"/>
+        </a:xfrm>
+      </p:grpSpPr>
+      <p:sp>
+        <p:nvSpPr>
+          <p:cNvPr id="2" name="Title 1"/>
+          <p:cNvSpPr>
+            <a:spLocks noGrp="1"/>
+          </p:cNvSpPr>
+          <p:nvPr>
+            <p:ph type="title"/>
+          </p:nvPr>
+        </p:nvSpPr>
+        <p:spPr>
+          <a:xfrm>
+            <a:off x="107505" y="152400"/>
+            <a:ext cx="8894452" cy="914400"/>
+          </a:xfrm>
+        </p:spPr>
+        <p:txBody>
+          <a:bodyPr>
+            <a:normAutofit/>
+          </a:bodyPr>
+          <a:lstStyle/>
+          <a:p>
+            <a:r>
+              <a:rPr lang="en-US" sz="3600" dirty="0" err="1">
+                <a:solidFill>
+                  <a:srgbClr val="00B0F0"/>
+                </a:solidFill>
+                <a:latin typeface="Adobe Heiti Std R" pitchFamily="34" charset="-128"/>
+                <a:ea typeface="Adobe Heiti Std R" pitchFamily="34" charset="-128"/>
+              </a:rPr>
+              <a:t>Herança</a:t>
+            </a:r>
+            <a:r>
+              <a:rPr lang="en-US" sz="3600" dirty="0">
+                <a:solidFill>
+                  <a:srgbClr val="00B0F0"/>
+                </a:solidFill>
+                <a:latin typeface="Adobe Heiti Std R" pitchFamily="34" charset="-128"/>
+                <a:ea typeface="Adobe Heiti Std R" pitchFamily="34" charset="-128"/>
+              </a:rPr>
+              <a:t> </a:t>
+            </a:r>
+            <a:r>
+              <a:rPr lang="en-US" sz="3600" dirty="0" err="1">
+                <a:solidFill>
+                  <a:srgbClr val="00B0F0"/>
+                </a:solidFill>
+                <a:latin typeface="Adobe Heiti Std R" pitchFamily="34" charset="-128"/>
+                <a:ea typeface="Adobe Heiti Std R" pitchFamily="34" charset="-128"/>
+              </a:rPr>
+              <a:t>em</a:t>
+            </a:r>
+            <a:r>
+              <a:rPr lang="en-US" sz="3600" dirty="0">
+                <a:solidFill>
+                  <a:srgbClr val="00B0F0"/>
+                </a:solidFill>
+                <a:latin typeface="Adobe Heiti Std R" pitchFamily="34" charset="-128"/>
+                <a:ea typeface="Adobe Heiti Std R" pitchFamily="34" charset="-128"/>
+              </a:rPr>
+              <a:t> </a:t>
+            </a:r>
+            <a:r>
+              <a:rPr lang="en-US" sz="3600" dirty="0" err="1">
+                <a:solidFill>
+                  <a:srgbClr val="00B0F0"/>
+                </a:solidFill>
+                <a:latin typeface="Adobe Heiti Std R" pitchFamily="34" charset="-128"/>
+                <a:ea typeface="Adobe Heiti Std R" pitchFamily="34" charset="-128"/>
+              </a:rPr>
+              <a:t>Javascript</a:t>
+            </a:r>
+            <a:r>
+              <a:rPr lang="en-US" sz="3600" dirty="0">
+                <a:solidFill>
+                  <a:srgbClr val="00B0F0"/>
+                </a:solidFill>
+                <a:latin typeface="Adobe Heiti Std R" pitchFamily="34" charset="-128"/>
+                <a:ea typeface="Adobe Heiti Std R" pitchFamily="34" charset="-128"/>
+              </a:rPr>
+              <a:t> </a:t>
+            </a:r>
+            <a:r>
+              <a:rPr lang="en-US" sz="3600" dirty="0" smtClean="0">
+                <a:solidFill>
+                  <a:srgbClr val="00B0F0"/>
+                </a:solidFill>
+                <a:latin typeface="Adobe Heiti Std R" pitchFamily="34" charset="-128"/>
+                <a:ea typeface="Adobe Heiti Std R" pitchFamily="34" charset="-128"/>
+              </a:rPr>
+              <a:t>(4) </a:t>
+            </a:r>
+            <a:endParaRPr lang="en-US" sz="3600" dirty="0">
+              <a:solidFill>
+                <a:srgbClr val="00B0F0"/>
+              </a:solidFill>
+              <a:latin typeface="Adobe Heiti Std R" pitchFamily="34" charset="-128"/>
+              <a:ea typeface="Adobe Heiti Std R" pitchFamily="34" charset="-128"/>
+            </a:endParaRPr>
+          </a:p>
+        </p:txBody>
+      </p:sp>
+      <p:sp>
+        <p:nvSpPr>
+          <p:cNvPr id="8" name="Espaço Reservado para Número de Slide 7"/>
+          <p:cNvSpPr>
+            <a:spLocks noGrp="1"/>
+          </p:cNvSpPr>
+          <p:nvPr>
+            <p:ph type="sldNum" sz="quarter" idx="12"/>
+          </p:nvPr>
+        </p:nvSpPr>
+        <p:spPr>
+          <a:xfrm>
+            <a:off x="6789060" y="6435906"/>
+            <a:ext cx="2133600" cy="365125"/>
+          </a:xfrm>
+        </p:spPr>
+        <p:txBody>
+          <a:bodyPr/>
+          <a:lstStyle/>
+          <a:p>
+            <a:r>
+              <a:rPr lang="en-US" sz="1800" dirty="0" smtClean="0">
+                <a:solidFill>
+                  <a:schemeClr val="bg1"/>
+                </a:solidFill>
+              </a:rPr>
+              <a:t>53</a:t>
+            </a:r>
+            <a:endParaRPr lang="en-US" sz="1800" dirty="0">
+              <a:solidFill>
+                <a:schemeClr val="bg1"/>
+              </a:solidFill>
+            </a:endParaRPr>
+          </a:p>
+        </p:txBody>
+      </p:sp>
+      <p:pic>
+        <p:nvPicPr>
+          <p:cNvPr id="7" name="Imagem 6"/>
+          <p:cNvPicPr>
+            <a:picLocks noChangeAspect="1"/>
+          </p:cNvPicPr>
+          <p:nvPr/>
+        </p:nvPicPr>
+        <p:blipFill>
+          <a:blip r:embed="rId2">
+            <a:extLst>
+              <a:ext uri="{28A0092B-C50C-407E-A947-70E740481C1C}">
+                <a14:useLocalDpi xmlns:a14="http://schemas.microsoft.com/office/drawing/2010/main" val="0"/>
+              </a:ext>
+            </a:extLst>
+          </a:blip>
+          <a:stretch>
+            <a:fillRect/>
+          </a:stretch>
+        </p:blipFill>
+        <p:spPr>
+          <a:xfrm>
+            <a:off x="-1044624" y="937217"/>
+            <a:ext cx="11089232" cy="502920"/>
+          </a:xfrm>
+          <a:prstGeom prst="rect">
+            <a:avLst/>
+          </a:prstGeom>
+        </p:spPr>
+      </p:pic>
+      <p:pic>
+        <p:nvPicPr>
+          <p:cNvPr id="6" name="Imagem 5"/>
+          <p:cNvPicPr>
+            <a:picLocks noChangeAspect="1"/>
+          </p:cNvPicPr>
+          <p:nvPr/>
+        </p:nvPicPr>
+        <p:blipFill>
+          <a:blip r:embed="rId3" cstate="print">
+            <a:extLst>
+              <a:ext uri="{28A0092B-C50C-407E-A947-70E740481C1C}">
+                <a14:useLocalDpi xmlns:a14="http://schemas.microsoft.com/office/drawing/2010/main" val="0"/>
+              </a:ext>
+            </a:extLst>
+          </a:blip>
+          <a:stretch>
+            <a:fillRect/>
+          </a:stretch>
+        </p:blipFill>
+        <p:spPr>
+          <a:xfrm>
+            <a:off x="266653" y="107704"/>
+            <a:ext cx="560931" cy="762614"/>
+          </a:xfrm>
+          <a:prstGeom prst="rect">
+            <a:avLst/>
+          </a:prstGeom>
+        </p:spPr>
+      </p:pic>
+      <p:sp>
+        <p:nvSpPr>
+          <p:cNvPr id="3" name="Espaço Reservado para Conteúdo 2"/>
+          <p:cNvSpPr>
+            <a:spLocks noGrp="1"/>
+          </p:cNvSpPr>
+          <p:nvPr>
+            <p:ph idx="1"/>
+          </p:nvPr>
+        </p:nvSpPr>
+        <p:spPr/>
+        <p:txBody>
+          <a:bodyPr/>
+          <a:lstStyle/>
+          <a:p>
+            <a:endParaRPr lang="en-US" dirty="0" smtClean="0"/>
+          </a:p>
+          <a:p>
+            <a:endParaRPr lang="en-US" dirty="0"/>
+          </a:p>
+          <a:p>
+            <a:endParaRPr lang="en-US" dirty="0" smtClean="0"/>
+          </a:p>
+          <a:p>
+            <a:endParaRPr lang="en-US" dirty="0"/>
+          </a:p>
+          <a:p>
+            <a:endParaRPr lang="en-US" dirty="0" smtClean="0"/>
+          </a:p>
+        </p:txBody>
+      </p:sp>
+      <p:pic>
+        <p:nvPicPr>
+          <p:cNvPr id="4" name="Imagem 3"/>
+          <p:cNvPicPr>
+            <a:picLocks noChangeAspect="1"/>
+          </p:cNvPicPr>
+          <p:nvPr/>
+        </p:nvPicPr>
+        <p:blipFill>
+          <a:blip r:embed="rId4"/>
+          <a:stretch>
+            <a:fillRect/>
+          </a:stretch>
+        </p:blipFill>
+        <p:spPr>
+          <a:xfrm>
+            <a:off x="107504" y="1254319"/>
+            <a:ext cx="9036496" cy="4932161"/>
+          </a:xfrm>
+          <a:prstGeom prst="rect">
+            <a:avLst/>
+          </a:prstGeom>
+        </p:spPr>
+      </p:pic>
+    </p:spTree>
+    <p:extLst>
+      <p:ext uri="{BB962C8B-B14F-4D97-AF65-F5344CB8AC3E}">
+        <p14:creationId xmlns:p14="http://schemas.microsoft.com/office/powerpoint/2010/main" val="1127587788"/>
+      </p:ext>
+    </p:extLst>
+  </p:cSld>
+  <p:clrMapOvr>
+    <a:masterClrMapping/>
+  </p:clrMapOvr>
+  <p:transition spd="slow"/>
+  <p:timing>
+    <p:tnLst>
+      <p:par>
+        <p:cTn id="1" dur="indefinite" restart="never" nodeType="tmRoot"/>
+      </p:par>
+    </p:tnLst>
+  </p:timing>
+</p:sld>
+</file>
+
+<file path=ppt/slides/slide55.xml><?xml version="1.0" encoding="utf-8"?>
+<p:sld xmlns:a="http://schemas.openxmlformats.org/drawingml/2006/main" xmlns:r="http://schemas.openxmlformats.org/officeDocument/2006/relationships" xmlns:p="http://schemas.openxmlformats.org/presentationml/2006/main">
+  <p:cSld>
+    <p:spTree>
+      <p:nvGrpSpPr>
+        <p:cNvPr id="1" name=""/>
+        <p:cNvGrpSpPr/>
+        <p:nvPr/>
+      </p:nvGrpSpPr>
+      <p:grpSpPr>
+        <a:xfrm>
+          <a:off x="0" y="0"/>
+          <a:ext cx="0" cy="0"/>
+          <a:chOff x="0" y="0"/>
+          <a:chExt cx="0" cy="0"/>
+        </a:xfrm>
+      </p:grpSpPr>
+      <p:sp>
+        <p:nvSpPr>
+          <p:cNvPr id="2" name="Title 1"/>
+          <p:cNvSpPr>
+            <a:spLocks noGrp="1"/>
+          </p:cNvSpPr>
+          <p:nvPr>
+            <p:ph type="title"/>
+          </p:nvPr>
+        </p:nvSpPr>
+        <p:spPr>
+          <a:xfrm>
+            <a:off x="107505" y="152400"/>
+            <a:ext cx="8894452" cy="914400"/>
+          </a:xfrm>
+        </p:spPr>
+        <p:txBody>
+          <a:bodyPr>
+            <a:normAutofit/>
+          </a:bodyPr>
+          <a:lstStyle/>
+          <a:p>
+            <a:r>
+              <a:rPr lang="en-US" sz="3600" dirty="0" err="1">
+                <a:solidFill>
+                  <a:srgbClr val="00B0F0"/>
+                </a:solidFill>
+                <a:latin typeface="Adobe Heiti Std R" pitchFamily="34" charset="-128"/>
+                <a:ea typeface="Adobe Heiti Std R" pitchFamily="34" charset="-128"/>
+              </a:rPr>
+              <a:t>Herança</a:t>
+            </a:r>
+            <a:r>
+              <a:rPr lang="en-US" sz="3600" dirty="0">
+                <a:solidFill>
+                  <a:srgbClr val="00B0F0"/>
+                </a:solidFill>
+                <a:latin typeface="Adobe Heiti Std R" pitchFamily="34" charset="-128"/>
+                <a:ea typeface="Adobe Heiti Std R" pitchFamily="34" charset="-128"/>
+              </a:rPr>
+              <a:t> </a:t>
+            </a:r>
+            <a:r>
+              <a:rPr lang="en-US" sz="3600" dirty="0" err="1">
+                <a:solidFill>
+                  <a:srgbClr val="00B0F0"/>
+                </a:solidFill>
+                <a:latin typeface="Adobe Heiti Std R" pitchFamily="34" charset="-128"/>
+                <a:ea typeface="Adobe Heiti Std R" pitchFamily="34" charset="-128"/>
+              </a:rPr>
+              <a:t>em</a:t>
+            </a:r>
+            <a:r>
+              <a:rPr lang="en-US" sz="3600" dirty="0">
+                <a:solidFill>
+                  <a:srgbClr val="00B0F0"/>
+                </a:solidFill>
+                <a:latin typeface="Adobe Heiti Std R" pitchFamily="34" charset="-128"/>
+                <a:ea typeface="Adobe Heiti Std R" pitchFamily="34" charset="-128"/>
+              </a:rPr>
+              <a:t> </a:t>
+            </a:r>
+            <a:r>
+              <a:rPr lang="en-US" sz="3600" dirty="0" err="1">
+                <a:solidFill>
+                  <a:srgbClr val="00B0F0"/>
+                </a:solidFill>
+                <a:latin typeface="Adobe Heiti Std R" pitchFamily="34" charset="-128"/>
+                <a:ea typeface="Adobe Heiti Std R" pitchFamily="34" charset="-128"/>
+              </a:rPr>
+              <a:t>Javascript</a:t>
+            </a:r>
+            <a:r>
+              <a:rPr lang="en-US" sz="3600" dirty="0">
+                <a:solidFill>
+                  <a:srgbClr val="00B0F0"/>
+                </a:solidFill>
+                <a:latin typeface="Adobe Heiti Std R" pitchFamily="34" charset="-128"/>
+                <a:ea typeface="Adobe Heiti Std R" pitchFamily="34" charset="-128"/>
+              </a:rPr>
+              <a:t> </a:t>
+            </a:r>
+            <a:r>
+              <a:rPr lang="en-US" sz="3600" dirty="0" smtClean="0">
+                <a:solidFill>
+                  <a:srgbClr val="00B0F0"/>
+                </a:solidFill>
+                <a:latin typeface="Adobe Heiti Std R" pitchFamily="34" charset="-128"/>
+                <a:ea typeface="Adobe Heiti Std R" pitchFamily="34" charset="-128"/>
+              </a:rPr>
+              <a:t>(5)  </a:t>
+            </a:r>
+            <a:endParaRPr lang="en-US" sz="3600" dirty="0">
+              <a:solidFill>
+                <a:srgbClr val="00B0F0"/>
+              </a:solidFill>
+              <a:latin typeface="Adobe Heiti Std R" pitchFamily="34" charset="-128"/>
+              <a:ea typeface="Adobe Heiti Std R" pitchFamily="34" charset="-128"/>
+            </a:endParaRPr>
+          </a:p>
+        </p:txBody>
+      </p:sp>
+      <p:sp>
+        <p:nvSpPr>
+          <p:cNvPr id="8" name="Espaço Reservado para Número de Slide 7"/>
+          <p:cNvSpPr>
+            <a:spLocks noGrp="1"/>
+          </p:cNvSpPr>
+          <p:nvPr>
+            <p:ph type="sldNum" sz="quarter" idx="12"/>
+          </p:nvPr>
+        </p:nvSpPr>
+        <p:spPr>
+          <a:xfrm>
+            <a:off x="6789060" y="6435906"/>
+            <a:ext cx="2133600" cy="365125"/>
+          </a:xfrm>
+        </p:spPr>
+        <p:txBody>
+          <a:bodyPr/>
+          <a:lstStyle/>
+          <a:p>
+            <a:r>
+              <a:rPr lang="en-US" sz="1800" dirty="0" smtClean="0">
+                <a:solidFill>
+                  <a:schemeClr val="bg1"/>
+                </a:solidFill>
+              </a:rPr>
+              <a:t>54</a:t>
+            </a:r>
+            <a:endParaRPr lang="en-US" sz="1800" dirty="0">
+              <a:solidFill>
+                <a:schemeClr val="bg1"/>
+              </a:solidFill>
+            </a:endParaRPr>
+          </a:p>
+        </p:txBody>
+      </p:sp>
+      <p:pic>
+        <p:nvPicPr>
+          <p:cNvPr id="7" name="Imagem 6"/>
+          <p:cNvPicPr>
+            <a:picLocks noChangeAspect="1"/>
+          </p:cNvPicPr>
+          <p:nvPr/>
+        </p:nvPicPr>
+        <p:blipFill>
+          <a:blip r:embed="rId2">
+            <a:extLst>
+              <a:ext uri="{28A0092B-C50C-407E-A947-70E740481C1C}">
+                <a14:useLocalDpi xmlns:a14="http://schemas.microsoft.com/office/drawing/2010/main" val="0"/>
+              </a:ext>
+            </a:extLst>
+          </a:blip>
+          <a:stretch>
+            <a:fillRect/>
+          </a:stretch>
+        </p:blipFill>
+        <p:spPr>
+          <a:xfrm>
+            <a:off x="-1044624" y="937217"/>
+            <a:ext cx="11089232" cy="502920"/>
+          </a:xfrm>
+          <a:prstGeom prst="rect">
+            <a:avLst/>
+          </a:prstGeom>
+        </p:spPr>
+      </p:pic>
+      <p:pic>
+        <p:nvPicPr>
+          <p:cNvPr id="6" name="Imagem 5"/>
+          <p:cNvPicPr>
+            <a:picLocks noChangeAspect="1"/>
+          </p:cNvPicPr>
+          <p:nvPr/>
+        </p:nvPicPr>
+        <p:blipFill>
+          <a:blip r:embed="rId3" cstate="print">
+            <a:extLst>
+              <a:ext uri="{28A0092B-C50C-407E-A947-70E740481C1C}">
+                <a14:useLocalDpi xmlns:a14="http://schemas.microsoft.com/office/drawing/2010/main" val="0"/>
+              </a:ext>
+            </a:extLst>
+          </a:blip>
+          <a:stretch>
+            <a:fillRect/>
+          </a:stretch>
+        </p:blipFill>
+        <p:spPr>
+          <a:xfrm>
+            <a:off x="266653" y="107704"/>
+            <a:ext cx="560931" cy="762614"/>
+          </a:xfrm>
+          <a:prstGeom prst="rect">
+            <a:avLst/>
+          </a:prstGeom>
+        </p:spPr>
+      </p:pic>
+      <p:sp>
+        <p:nvSpPr>
+          <p:cNvPr id="3" name="Espaço Reservado para Conteúdo 2"/>
+          <p:cNvSpPr>
+            <a:spLocks noGrp="1"/>
+          </p:cNvSpPr>
+          <p:nvPr>
+            <p:ph idx="1"/>
+          </p:nvPr>
+        </p:nvSpPr>
+        <p:spPr/>
+        <p:txBody>
+          <a:bodyPr/>
+          <a:lstStyle/>
+          <a:p>
+            <a:endParaRPr lang="en-US" dirty="0" smtClean="0"/>
+          </a:p>
+          <a:p>
+            <a:endParaRPr lang="en-US" dirty="0"/>
+          </a:p>
+          <a:p>
+            <a:endParaRPr lang="en-US" dirty="0" smtClean="0"/>
+          </a:p>
+          <a:p>
+            <a:endParaRPr lang="en-US" dirty="0"/>
+          </a:p>
+          <a:p>
+            <a:endParaRPr lang="en-US" dirty="0" smtClean="0"/>
+          </a:p>
+        </p:txBody>
+      </p:sp>
+      <p:sp>
+        <p:nvSpPr>
+          <p:cNvPr id="5" name="CaixaDeTexto 4"/>
+          <p:cNvSpPr txBox="1"/>
+          <p:nvPr/>
+        </p:nvSpPr>
+        <p:spPr>
+          <a:xfrm>
+            <a:off x="266653" y="1289336"/>
+            <a:ext cx="8420147" cy="461665"/>
+          </a:xfrm>
+          <a:prstGeom prst="rect">
+            <a:avLst/>
+          </a:prstGeom>
+          <a:noFill/>
+        </p:spPr>
+        <p:txBody>
+          <a:bodyPr wrap="square" rtlCol="0">
+            <a:spAutoFit/>
+          </a:bodyPr>
+          <a:lstStyle/>
+          <a:p>
+            <a:pPr algn="ctr"/>
+            <a:r>
+              <a:rPr lang="en-US" sz="2400" b="1" dirty="0" smtClean="0"/>
+              <a:t>PROGRAMAÇÃO BASEADA EM PROTÓTIPOS</a:t>
+            </a:r>
+            <a:endParaRPr lang="pt-BR" sz="2400" b="1" dirty="0"/>
+          </a:p>
+        </p:txBody>
+      </p:sp>
+      <p:pic>
+        <p:nvPicPr>
+          <p:cNvPr id="9" name="Imagem 8"/>
+          <p:cNvPicPr>
+            <a:picLocks noChangeAspect="1"/>
+          </p:cNvPicPr>
+          <p:nvPr/>
+        </p:nvPicPr>
+        <p:blipFill>
+          <a:blip r:embed="rId4"/>
+          <a:stretch>
+            <a:fillRect/>
+          </a:stretch>
+        </p:blipFill>
+        <p:spPr>
+          <a:xfrm>
+            <a:off x="1547664" y="1851616"/>
+            <a:ext cx="5616624" cy="1985825"/>
+          </a:xfrm>
+          <a:prstGeom prst="rect">
+            <a:avLst/>
+          </a:prstGeom>
+        </p:spPr>
+      </p:pic>
+      <p:sp>
+        <p:nvSpPr>
+          <p:cNvPr id="10" name="CaixaDeTexto 9"/>
+          <p:cNvSpPr txBox="1"/>
+          <p:nvPr/>
+        </p:nvSpPr>
+        <p:spPr>
+          <a:xfrm>
+            <a:off x="683568" y="4293096"/>
+            <a:ext cx="6912768" cy="523220"/>
+          </a:xfrm>
+          <a:prstGeom prst="rect">
+            <a:avLst/>
+          </a:prstGeom>
+          <a:noFill/>
+        </p:spPr>
+        <p:txBody>
+          <a:bodyPr wrap="square" rtlCol="0">
+            <a:spAutoFit/>
+          </a:bodyPr>
+          <a:lstStyle/>
+          <a:p>
+            <a:r>
+              <a:rPr lang="en-US" sz="2800" dirty="0" err="1" smtClean="0"/>
+              <a:t>Qual</a:t>
+            </a:r>
+            <a:r>
+              <a:rPr lang="en-US" sz="2800" dirty="0" smtClean="0"/>
+              <a:t> </a:t>
+            </a:r>
+            <a:r>
+              <a:rPr lang="en-US" sz="2800" dirty="0" err="1" smtClean="0"/>
+              <a:t>será</a:t>
+            </a:r>
+            <a:r>
+              <a:rPr lang="en-US" sz="2800" dirty="0" smtClean="0"/>
+              <a:t> o </a:t>
+            </a:r>
+            <a:r>
+              <a:rPr lang="en-US" sz="2800" dirty="0" err="1" smtClean="0"/>
+              <a:t>resultado</a:t>
+            </a:r>
+            <a:r>
+              <a:rPr lang="en-US" sz="2800" dirty="0" smtClean="0"/>
+              <a:t>?</a:t>
+            </a:r>
+            <a:endParaRPr lang="pt-BR" sz="2800" dirty="0"/>
+          </a:p>
+        </p:txBody>
+      </p:sp>
+    </p:spTree>
+    <p:extLst>
+      <p:ext uri="{BB962C8B-B14F-4D97-AF65-F5344CB8AC3E}">
+        <p14:creationId xmlns:p14="http://schemas.microsoft.com/office/powerpoint/2010/main" val="3512245683"/>
+      </p:ext>
+    </p:extLst>
+  </p:cSld>
+  <p:clrMapOvr>
+    <a:masterClrMapping/>
+  </p:clrMapOvr>
+  <p:transition spd="slow"/>
+  <p:timing>
+    <p:tnLst>
+      <p:par>
+        <p:cTn id="1" dur="indefinite" restart="never" nodeType="tmRoot"/>
+      </p:par>
+    </p:tnLst>
+  </p:timing>
+</p:sld>
+</file>
+
+<file path=ppt/slides/slide56.xml><?xml version="1.0" encoding="utf-8"?>
+<p:sld xmlns:a="http://schemas.openxmlformats.org/drawingml/2006/main" xmlns:r="http://schemas.openxmlformats.org/officeDocument/2006/relationships" xmlns:p="http://schemas.openxmlformats.org/presentationml/2006/main">
+  <p:cSld>
+    <p:spTree>
+      <p:nvGrpSpPr>
+        <p:cNvPr id="1" name=""/>
+        <p:cNvGrpSpPr/>
+        <p:nvPr/>
+      </p:nvGrpSpPr>
+      <p:grpSpPr>
+        <a:xfrm>
+          <a:off x="0" y="0"/>
+          <a:ext cx="0" cy="0"/>
+          <a:chOff x="0" y="0"/>
+          <a:chExt cx="0" cy="0"/>
+        </a:xfrm>
+      </p:grpSpPr>
+      <p:sp>
+        <p:nvSpPr>
+          <p:cNvPr id="2" name="Title 1"/>
+          <p:cNvSpPr>
+            <a:spLocks noGrp="1"/>
+          </p:cNvSpPr>
+          <p:nvPr>
+            <p:ph type="title"/>
+          </p:nvPr>
+        </p:nvSpPr>
+        <p:spPr>
+          <a:xfrm>
+            <a:off x="107505" y="152400"/>
+            <a:ext cx="8894452" cy="914400"/>
+          </a:xfrm>
+        </p:spPr>
+        <p:txBody>
+          <a:bodyPr>
+            <a:normAutofit/>
+          </a:bodyPr>
+          <a:lstStyle/>
+          <a:p>
+            <a:r>
+              <a:rPr lang="en-US" sz="3600" dirty="0" err="1">
+                <a:solidFill>
+                  <a:srgbClr val="00B0F0"/>
+                </a:solidFill>
+                <a:latin typeface="Adobe Heiti Std R" pitchFamily="34" charset="-128"/>
+                <a:ea typeface="Adobe Heiti Std R" pitchFamily="34" charset="-128"/>
+              </a:rPr>
+              <a:t>Herança</a:t>
+            </a:r>
+            <a:r>
+              <a:rPr lang="en-US" sz="3600" dirty="0">
+                <a:solidFill>
+                  <a:srgbClr val="00B0F0"/>
+                </a:solidFill>
+                <a:latin typeface="Adobe Heiti Std R" pitchFamily="34" charset="-128"/>
+                <a:ea typeface="Adobe Heiti Std R" pitchFamily="34" charset="-128"/>
+              </a:rPr>
+              <a:t> </a:t>
+            </a:r>
+            <a:r>
+              <a:rPr lang="en-US" sz="3600" dirty="0" err="1">
+                <a:solidFill>
+                  <a:srgbClr val="00B0F0"/>
+                </a:solidFill>
+                <a:latin typeface="Adobe Heiti Std R" pitchFamily="34" charset="-128"/>
+                <a:ea typeface="Adobe Heiti Std R" pitchFamily="34" charset="-128"/>
+              </a:rPr>
+              <a:t>em</a:t>
+            </a:r>
+            <a:r>
+              <a:rPr lang="en-US" sz="3600" dirty="0">
+                <a:solidFill>
+                  <a:srgbClr val="00B0F0"/>
+                </a:solidFill>
+                <a:latin typeface="Adobe Heiti Std R" pitchFamily="34" charset="-128"/>
+                <a:ea typeface="Adobe Heiti Std R" pitchFamily="34" charset="-128"/>
+              </a:rPr>
+              <a:t> </a:t>
+            </a:r>
+            <a:r>
+              <a:rPr lang="en-US" sz="3600" dirty="0" err="1">
+                <a:solidFill>
+                  <a:srgbClr val="00B0F0"/>
+                </a:solidFill>
+                <a:latin typeface="Adobe Heiti Std R" pitchFamily="34" charset="-128"/>
+                <a:ea typeface="Adobe Heiti Std R" pitchFamily="34" charset="-128"/>
+              </a:rPr>
+              <a:t>Javascript</a:t>
+            </a:r>
+            <a:r>
+              <a:rPr lang="en-US" sz="3600" dirty="0">
+                <a:solidFill>
+                  <a:srgbClr val="00B0F0"/>
+                </a:solidFill>
+                <a:latin typeface="Adobe Heiti Std R" pitchFamily="34" charset="-128"/>
+                <a:ea typeface="Adobe Heiti Std R" pitchFamily="34" charset="-128"/>
+              </a:rPr>
+              <a:t> </a:t>
+            </a:r>
+            <a:r>
+              <a:rPr lang="en-US" sz="3600" dirty="0" smtClean="0">
+                <a:solidFill>
+                  <a:srgbClr val="00B0F0"/>
+                </a:solidFill>
+                <a:latin typeface="Adobe Heiti Std R" pitchFamily="34" charset="-128"/>
+                <a:ea typeface="Adobe Heiti Std R" pitchFamily="34" charset="-128"/>
+              </a:rPr>
+              <a:t>(6)  </a:t>
+            </a:r>
+            <a:endParaRPr lang="en-US" sz="3600" dirty="0">
+              <a:solidFill>
+                <a:srgbClr val="00B0F0"/>
+              </a:solidFill>
+              <a:latin typeface="Adobe Heiti Std R" pitchFamily="34" charset="-128"/>
+              <a:ea typeface="Adobe Heiti Std R" pitchFamily="34" charset="-128"/>
+            </a:endParaRPr>
+          </a:p>
+        </p:txBody>
+      </p:sp>
+      <p:sp>
+        <p:nvSpPr>
+          <p:cNvPr id="8" name="Espaço Reservado para Número de Slide 7"/>
+          <p:cNvSpPr>
+            <a:spLocks noGrp="1"/>
+          </p:cNvSpPr>
+          <p:nvPr>
+            <p:ph type="sldNum" sz="quarter" idx="12"/>
+          </p:nvPr>
+        </p:nvSpPr>
+        <p:spPr>
+          <a:xfrm>
+            <a:off x="6789060" y="6435906"/>
+            <a:ext cx="2133600" cy="365125"/>
+          </a:xfrm>
+        </p:spPr>
+        <p:txBody>
+          <a:bodyPr/>
+          <a:lstStyle/>
+          <a:p>
+            <a:r>
+              <a:rPr lang="en-US" sz="1800" dirty="0" smtClean="0">
+                <a:solidFill>
+                  <a:schemeClr val="bg1"/>
+                </a:solidFill>
+              </a:rPr>
+              <a:t>55</a:t>
+            </a:r>
+            <a:endParaRPr lang="en-US" sz="1800" dirty="0">
+              <a:solidFill>
+                <a:schemeClr val="bg1"/>
+              </a:solidFill>
+            </a:endParaRPr>
+          </a:p>
+        </p:txBody>
+      </p:sp>
+      <p:pic>
+        <p:nvPicPr>
+          <p:cNvPr id="7" name="Imagem 6"/>
+          <p:cNvPicPr>
+            <a:picLocks noChangeAspect="1"/>
+          </p:cNvPicPr>
+          <p:nvPr/>
+        </p:nvPicPr>
+        <p:blipFill>
+          <a:blip r:embed="rId2">
+            <a:extLst>
+              <a:ext uri="{28A0092B-C50C-407E-A947-70E740481C1C}">
+                <a14:useLocalDpi xmlns:a14="http://schemas.microsoft.com/office/drawing/2010/main" val="0"/>
+              </a:ext>
+            </a:extLst>
+          </a:blip>
+          <a:stretch>
+            <a:fillRect/>
+          </a:stretch>
+        </p:blipFill>
+        <p:spPr>
+          <a:xfrm>
+            <a:off x="-1044624" y="937217"/>
+            <a:ext cx="11089232" cy="502920"/>
+          </a:xfrm>
+          <a:prstGeom prst="rect">
+            <a:avLst/>
+          </a:prstGeom>
+        </p:spPr>
+      </p:pic>
+      <p:pic>
+        <p:nvPicPr>
+          <p:cNvPr id="6" name="Imagem 5"/>
+          <p:cNvPicPr>
+            <a:picLocks noChangeAspect="1"/>
+          </p:cNvPicPr>
+          <p:nvPr/>
+        </p:nvPicPr>
+        <p:blipFill>
+          <a:blip r:embed="rId3" cstate="print">
+            <a:extLst>
+              <a:ext uri="{28A0092B-C50C-407E-A947-70E740481C1C}">
+                <a14:useLocalDpi xmlns:a14="http://schemas.microsoft.com/office/drawing/2010/main" val="0"/>
+              </a:ext>
+            </a:extLst>
+          </a:blip>
+          <a:stretch>
+            <a:fillRect/>
+          </a:stretch>
+        </p:blipFill>
+        <p:spPr>
+          <a:xfrm>
+            <a:off x="266653" y="107704"/>
+            <a:ext cx="560931" cy="762614"/>
+          </a:xfrm>
+          <a:prstGeom prst="rect">
+            <a:avLst/>
+          </a:prstGeom>
+        </p:spPr>
+      </p:pic>
+      <p:sp>
+        <p:nvSpPr>
+          <p:cNvPr id="3" name="Espaço Reservado para Conteúdo 2"/>
+          <p:cNvSpPr>
+            <a:spLocks noGrp="1"/>
+          </p:cNvSpPr>
+          <p:nvPr>
+            <p:ph idx="1"/>
+          </p:nvPr>
+        </p:nvSpPr>
+        <p:spPr/>
+        <p:txBody>
+          <a:bodyPr/>
+          <a:lstStyle/>
+          <a:p>
+            <a:endParaRPr lang="en-US" dirty="0" smtClean="0"/>
+          </a:p>
+          <a:p>
+            <a:endParaRPr lang="en-US" dirty="0"/>
+          </a:p>
+          <a:p>
+            <a:endParaRPr lang="en-US" dirty="0" smtClean="0"/>
+          </a:p>
+          <a:p>
+            <a:endParaRPr lang="en-US" dirty="0"/>
+          </a:p>
+          <a:p>
+            <a:endParaRPr lang="en-US" dirty="0" smtClean="0"/>
+          </a:p>
+        </p:txBody>
+      </p:sp>
+      <p:sp>
+        <p:nvSpPr>
+          <p:cNvPr id="5" name="CaixaDeTexto 4"/>
+          <p:cNvSpPr txBox="1"/>
+          <p:nvPr/>
+        </p:nvSpPr>
+        <p:spPr>
+          <a:xfrm>
+            <a:off x="266653" y="1289336"/>
+            <a:ext cx="8420147" cy="461665"/>
+          </a:xfrm>
+          <a:prstGeom prst="rect">
+            <a:avLst/>
+          </a:prstGeom>
+          <a:noFill/>
+        </p:spPr>
+        <p:txBody>
+          <a:bodyPr wrap="square" rtlCol="0">
+            <a:spAutoFit/>
+          </a:bodyPr>
+          <a:lstStyle/>
+          <a:p>
+            <a:pPr algn="ctr"/>
+            <a:r>
+              <a:rPr lang="en-US" sz="2400" b="1" dirty="0" smtClean="0"/>
+              <a:t>PROGRAMAÇÃO BASEADA EM PROTÓTIPOS</a:t>
+            </a:r>
+            <a:endParaRPr lang="pt-BR" sz="2400" b="1" dirty="0"/>
+          </a:p>
+        </p:txBody>
+      </p:sp>
+      <p:sp>
+        <p:nvSpPr>
+          <p:cNvPr id="10" name="CaixaDeTexto 9"/>
+          <p:cNvSpPr txBox="1"/>
+          <p:nvPr/>
+        </p:nvSpPr>
+        <p:spPr>
+          <a:xfrm>
+            <a:off x="100360" y="5546137"/>
+            <a:ext cx="6912768" cy="523220"/>
+          </a:xfrm>
+          <a:prstGeom prst="rect">
+            <a:avLst/>
+          </a:prstGeom>
+          <a:noFill/>
+        </p:spPr>
+        <p:txBody>
+          <a:bodyPr wrap="square" rtlCol="0">
+            <a:spAutoFit/>
+          </a:bodyPr>
+          <a:lstStyle/>
+          <a:p>
+            <a:r>
+              <a:rPr lang="en-US" sz="2800" dirty="0" err="1" smtClean="0"/>
+              <a:t>Qual</a:t>
+            </a:r>
+            <a:r>
+              <a:rPr lang="en-US" sz="2800" dirty="0" smtClean="0"/>
+              <a:t> </a:t>
+            </a:r>
+            <a:r>
+              <a:rPr lang="en-US" sz="2800" dirty="0" err="1" smtClean="0"/>
+              <a:t>será</a:t>
+            </a:r>
+            <a:r>
+              <a:rPr lang="en-US" sz="2800" dirty="0" smtClean="0"/>
+              <a:t> o </a:t>
+            </a:r>
+            <a:r>
+              <a:rPr lang="en-US" sz="2800" dirty="0" err="1" smtClean="0"/>
+              <a:t>resultado</a:t>
+            </a:r>
+            <a:r>
+              <a:rPr lang="en-US" sz="2800" dirty="0" smtClean="0"/>
+              <a:t>?</a:t>
+            </a:r>
+            <a:endParaRPr lang="pt-BR" sz="2800" dirty="0"/>
+          </a:p>
+        </p:txBody>
+      </p:sp>
+      <p:pic>
+        <p:nvPicPr>
+          <p:cNvPr id="4" name="Imagem 3"/>
+          <p:cNvPicPr>
+            <a:picLocks noChangeAspect="1"/>
+          </p:cNvPicPr>
+          <p:nvPr/>
+        </p:nvPicPr>
+        <p:blipFill>
+          <a:blip r:embed="rId4"/>
+          <a:stretch>
+            <a:fillRect/>
+          </a:stretch>
+        </p:blipFill>
+        <p:spPr>
+          <a:xfrm>
+            <a:off x="1043607" y="1808442"/>
+            <a:ext cx="7177225" cy="2916702"/>
+          </a:xfrm>
+          <a:prstGeom prst="rect">
+            <a:avLst/>
+          </a:prstGeom>
+        </p:spPr>
+      </p:pic>
+    </p:spTree>
+    <p:extLst>
+      <p:ext uri="{BB962C8B-B14F-4D97-AF65-F5344CB8AC3E}">
+        <p14:creationId xmlns:p14="http://schemas.microsoft.com/office/powerpoint/2010/main" val="1050305811"/>
+      </p:ext>
+    </p:extLst>
+  </p:cSld>
+  <p:clrMapOvr>
+    <a:masterClrMapping/>
+  </p:clrMapOvr>
+  <p:transition spd="slow"/>
+  <p:timing>
+    <p:tnLst>
+      <p:par>
+        <p:cTn id="1" dur="indefinite" restart="never" nodeType="tmRoot"/>
+      </p:par>
+    </p:tnLst>
+  </p:timing>
+</p:sld>
+</file>
+
+<file path=ppt/slides/slide57.xml><?xml version="1.0" encoding="utf-8"?>
+<p:sld xmlns:a="http://schemas.openxmlformats.org/drawingml/2006/main" xmlns:r="http://schemas.openxmlformats.org/officeDocument/2006/relationships" xmlns:p="http://schemas.openxmlformats.org/presentationml/2006/main">
+  <p:cSld>
+    <p:spTree>
+      <p:nvGrpSpPr>
+        <p:cNvPr id="1" name=""/>
+        <p:cNvGrpSpPr/>
+        <p:nvPr/>
+      </p:nvGrpSpPr>
+      <p:grpSpPr>
+        <a:xfrm>
+          <a:off x="0" y="0"/>
+          <a:ext cx="0" cy="0"/>
+          <a:chOff x="0" y="0"/>
+          <a:chExt cx="0" cy="0"/>
+        </a:xfrm>
+      </p:grpSpPr>
+      <p:sp>
+        <p:nvSpPr>
+          <p:cNvPr id="2" name="Title 1"/>
+          <p:cNvSpPr>
+            <a:spLocks noGrp="1"/>
+          </p:cNvSpPr>
+          <p:nvPr>
+            <p:ph type="title"/>
+          </p:nvPr>
+        </p:nvSpPr>
+        <p:spPr>
+          <a:xfrm>
+            <a:off x="107505" y="152400"/>
+            <a:ext cx="8894452" cy="914400"/>
+          </a:xfrm>
+        </p:spPr>
+        <p:txBody>
+          <a:bodyPr>
+            <a:normAutofit/>
+          </a:bodyPr>
+          <a:lstStyle/>
+          <a:p>
+            <a:r>
+              <a:rPr lang="en-US" sz="3600" dirty="0" err="1">
+                <a:solidFill>
+                  <a:srgbClr val="00B0F0"/>
+                </a:solidFill>
+                <a:latin typeface="Adobe Heiti Std R" pitchFamily="34" charset="-128"/>
+                <a:ea typeface="Adobe Heiti Std R" pitchFamily="34" charset="-128"/>
+              </a:rPr>
+              <a:t>Herança</a:t>
+            </a:r>
+            <a:r>
+              <a:rPr lang="en-US" sz="3600" dirty="0">
+                <a:solidFill>
+                  <a:srgbClr val="00B0F0"/>
+                </a:solidFill>
+                <a:latin typeface="Adobe Heiti Std R" pitchFamily="34" charset="-128"/>
+                <a:ea typeface="Adobe Heiti Std R" pitchFamily="34" charset="-128"/>
+              </a:rPr>
+              <a:t> </a:t>
+            </a:r>
+            <a:r>
+              <a:rPr lang="en-US" sz="3600" dirty="0" err="1">
+                <a:solidFill>
+                  <a:srgbClr val="00B0F0"/>
+                </a:solidFill>
+                <a:latin typeface="Adobe Heiti Std R" pitchFamily="34" charset="-128"/>
+                <a:ea typeface="Adobe Heiti Std R" pitchFamily="34" charset="-128"/>
+              </a:rPr>
+              <a:t>em</a:t>
+            </a:r>
+            <a:r>
+              <a:rPr lang="en-US" sz="3600" dirty="0">
+                <a:solidFill>
+                  <a:srgbClr val="00B0F0"/>
+                </a:solidFill>
+                <a:latin typeface="Adobe Heiti Std R" pitchFamily="34" charset="-128"/>
+                <a:ea typeface="Adobe Heiti Std R" pitchFamily="34" charset="-128"/>
+              </a:rPr>
+              <a:t> </a:t>
+            </a:r>
+            <a:r>
+              <a:rPr lang="en-US" sz="3600" dirty="0" err="1">
+                <a:solidFill>
+                  <a:srgbClr val="00B0F0"/>
+                </a:solidFill>
+                <a:latin typeface="Adobe Heiti Std R" pitchFamily="34" charset="-128"/>
+                <a:ea typeface="Adobe Heiti Std R" pitchFamily="34" charset="-128"/>
+              </a:rPr>
+              <a:t>Javascript</a:t>
+            </a:r>
+            <a:r>
+              <a:rPr lang="en-US" sz="3600" dirty="0">
+                <a:solidFill>
+                  <a:srgbClr val="00B0F0"/>
+                </a:solidFill>
+                <a:latin typeface="Adobe Heiti Std R" pitchFamily="34" charset="-128"/>
+                <a:ea typeface="Adobe Heiti Std R" pitchFamily="34" charset="-128"/>
+              </a:rPr>
+              <a:t> </a:t>
+            </a:r>
+            <a:r>
+              <a:rPr lang="en-US" sz="3600" dirty="0" smtClean="0">
+                <a:solidFill>
+                  <a:srgbClr val="00B0F0"/>
+                </a:solidFill>
+                <a:latin typeface="Adobe Heiti Std R" pitchFamily="34" charset="-128"/>
+                <a:ea typeface="Adobe Heiti Std R" pitchFamily="34" charset="-128"/>
+              </a:rPr>
+              <a:t>(7)  </a:t>
+            </a:r>
+            <a:endParaRPr lang="en-US" sz="3600" dirty="0">
+              <a:solidFill>
+                <a:srgbClr val="00B0F0"/>
+              </a:solidFill>
+              <a:latin typeface="Adobe Heiti Std R" pitchFamily="34" charset="-128"/>
+              <a:ea typeface="Adobe Heiti Std R" pitchFamily="34" charset="-128"/>
+            </a:endParaRPr>
+          </a:p>
+        </p:txBody>
+      </p:sp>
+      <p:sp>
+        <p:nvSpPr>
+          <p:cNvPr id="8" name="Espaço Reservado para Número de Slide 7"/>
+          <p:cNvSpPr>
+            <a:spLocks noGrp="1"/>
+          </p:cNvSpPr>
+          <p:nvPr>
+            <p:ph type="sldNum" sz="quarter" idx="12"/>
+          </p:nvPr>
+        </p:nvSpPr>
+        <p:spPr>
+          <a:xfrm>
+            <a:off x="6789060" y="6435906"/>
+            <a:ext cx="2133600" cy="365125"/>
+          </a:xfrm>
+        </p:spPr>
+        <p:txBody>
+          <a:bodyPr/>
+          <a:lstStyle/>
+          <a:p>
+            <a:r>
+              <a:rPr lang="en-US" sz="1800" dirty="0" smtClean="0">
+                <a:solidFill>
+                  <a:schemeClr val="bg1"/>
+                </a:solidFill>
+              </a:rPr>
+              <a:t>56</a:t>
+            </a:r>
+            <a:endParaRPr lang="en-US" sz="1800" dirty="0">
+              <a:solidFill>
+                <a:schemeClr val="bg1"/>
+              </a:solidFill>
+            </a:endParaRPr>
+          </a:p>
+        </p:txBody>
+      </p:sp>
+      <p:pic>
+        <p:nvPicPr>
+          <p:cNvPr id="7" name="Imagem 6"/>
+          <p:cNvPicPr>
+            <a:picLocks noChangeAspect="1"/>
+          </p:cNvPicPr>
+          <p:nvPr/>
+        </p:nvPicPr>
+        <p:blipFill>
+          <a:blip r:embed="rId2">
+            <a:extLst>
+              <a:ext uri="{28A0092B-C50C-407E-A947-70E740481C1C}">
+                <a14:useLocalDpi xmlns:a14="http://schemas.microsoft.com/office/drawing/2010/main" val="0"/>
+              </a:ext>
+            </a:extLst>
+          </a:blip>
+          <a:stretch>
+            <a:fillRect/>
+          </a:stretch>
+        </p:blipFill>
+        <p:spPr>
+          <a:xfrm>
+            <a:off x="-1044624" y="937217"/>
+            <a:ext cx="11089232" cy="502920"/>
+          </a:xfrm>
+          <a:prstGeom prst="rect">
+            <a:avLst/>
+          </a:prstGeom>
+        </p:spPr>
+      </p:pic>
+      <p:pic>
+        <p:nvPicPr>
+          <p:cNvPr id="6" name="Imagem 5"/>
+          <p:cNvPicPr>
+            <a:picLocks noChangeAspect="1"/>
+          </p:cNvPicPr>
+          <p:nvPr/>
+        </p:nvPicPr>
+        <p:blipFill>
+          <a:blip r:embed="rId3" cstate="print">
+            <a:extLst>
+              <a:ext uri="{28A0092B-C50C-407E-A947-70E740481C1C}">
+                <a14:useLocalDpi xmlns:a14="http://schemas.microsoft.com/office/drawing/2010/main" val="0"/>
+              </a:ext>
+            </a:extLst>
+          </a:blip>
+          <a:stretch>
+            <a:fillRect/>
+          </a:stretch>
+        </p:blipFill>
+        <p:spPr>
+          <a:xfrm>
+            <a:off x="266653" y="107704"/>
+            <a:ext cx="560931" cy="762614"/>
+          </a:xfrm>
+          <a:prstGeom prst="rect">
+            <a:avLst/>
+          </a:prstGeom>
+        </p:spPr>
+      </p:pic>
+      <p:sp>
+        <p:nvSpPr>
+          <p:cNvPr id="3" name="Espaço Reservado para Conteúdo 2"/>
+          <p:cNvSpPr>
+            <a:spLocks noGrp="1"/>
+          </p:cNvSpPr>
+          <p:nvPr>
+            <p:ph idx="1"/>
+          </p:nvPr>
+        </p:nvSpPr>
+        <p:spPr/>
+        <p:txBody>
+          <a:bodyPr/>
+          <a:lstStyle/>
+          <a:p>
+            <a:endParaRPr lang="en-US" dirty="0" smtClean="0"/>
+          </a:p>
+          <a:p>
+            <a:endParaRPr lang="en-US" dirty="0"/>
+          </a:p>
+          <a:p>
+            <a:endParaRPr lang="en-US" dirty="0" smtClean="0"/>
+          </a:p>
+          <a:p>
+            <a:endParaRPr lang="en-US" dirty="0"/>
+          </a:p>
+          <a:p>
+            <a:endParaRPr lang="en-US" dirty="0" smtClean="0"/>
+          </a:p>
+        </p:txBody>
+      </p:sp>
+      <p:pic>
+        <p:nvPicPr>
+          <p:cNvPr id="9" name="Imagem 8"/>
+          <p:cNvPicPr>
+            <a:picLocks noChangeAspect="1"/>
+          </p:cNvPicPr>
+          <p:nvPr/>
+        </p:nvPicPr>
+        <p:blipFill>
+          <a:blip r:embed="rId4"/>
+          <a:stretch>
+            <a:fillRect/>
+          </a:stretch>
+        </p:blipFill>
+        <p:spPr>
+          <a:xfrm>
+            <a:off x="0" y="1252890"/>
+            <a:ext cx="9144000" cy="4898493"/>
+          </a:xfrm>
+          <a:prstGeom prst="rect">
+            <a:avLst/>
+          </a:prstGeom>
+        </p:spPr>
+      </p:pic>
+    </p:spTree>
+    <p:extLst>
+      <p:ext uri="{BB962C8B-B14F-4D97-AF65-F5344CB8AC3E}">
+        <p14:creationId xmlns:p14="http://schemas.microsoft.com/office/powerpoint/2010/main" val="1616184398"/>
+      </p:ext>
+    </p:extLst>
+  </p:cSld>
+  <p:clrMapOvr>
+    <a:masterClrMapping/>
+  </p:clrMapOvr>
+  <p:transition spd="slow"/>
+  <p:timing>
+    <p:tnLst>
+      <p:par>
+        <p:cTn id="1" dur="indefinite" restart="never" nodeType="tmRoot"/>
+      </p:par>
+    </p:tnLst>
+  </p:timing>
+</p:sld>
+</file>
+
+<file path=ppt/slides/slide58.xml><?xml version="1.0" encoding="utf-8"?>
+<p:sld xmlns:a="http://schemas.openxmlformats.org/drawingml/2006/main" xmlns:r="http://schemas.openxmlformats.org/officeDocument/2006/relationships" xmlns:p="http://schemas.openxmlformats.org/presentationml/2006/main">
+  <p:cSld>
+    <p:spTree>
+      <p:nvGrpSpPr>
+        <p:cNvPr id="1" name=""/>
+        <p:cNvGrpSpPr/>
+        <p:nvPr/>
+      </p:nvGrpSpPr>
+      <p:grpSpPr>
+        <a:xfrm>
+          <a:off x="0" y="0"/>
+          <a:ext cx="0" cy="0"/>
+          <a:chOff x="0" y="0"/>
+          <a:chExt cx="0" cy="0"/>
+        </a:xfrm>
+      </p:grpSpPr>
+      <p:sp>
+        <p:nvSpPr>
+          <p:cNvPr id="2" name="Title 1"/>
+          <p:cNvSpPr>
+            <a:spLocks noGrp="1"/>
+          </p:cNvSpPr>
+          <p:nvPr>
+            <p:ph type="title"/>
+          </p:nvPr>
+        </p:nvSpPr>
+        <p:spPr>
+          <a:xfrm>
+            <a:off x="107505" y="152400"/>
+            <a:ext cx="8894452" cy="914400"/>
+          </a:xfrm>
+        </p:spPr>
+        <p:txBody>
+          <a:bodyPr>
+            <a:normAutofit/>
+          </a:bodyPr>
+          <a:lstStyle/>
+          <a:p>
+            <a:r>
+              <a:rPr lang="en-US" sz="3600" dirty="0" err="1">
+                <a:solidFill>
+                  <a:srgbClr val="00B0F0"/>
+                </a:solidFill>
+                <a:latin typeface="Adobe Heiti Std R" pitchFamily="34" charset="-128"/>
+                <a:ea typeface="Adobe Heiti Std R" pitchFamily="34" charset="-128"/>
+              </a:rPr>
+              <a:t>Herança</a:t>
+            </a:r>
+            <a:r>
+              <a:rPr lang="en-US" sz="3600" dirty="0">
+                <a:solidFill>
+                  <a:srgbClr val="00B0F0"/>
+                </a:solidFill>
+                <a:latin typeface="Adobe Heiti Std R" pitchFamily="34" charset="-128"/>
+                <a:ea typeface="Adobe Heiti Std R" pitchFamily="34" charset="-128"/>
+              </a:rPr>
+              <a:t> </a:t>
+            </a:r>
+            <a:r>
+              <a:rPr lang="en-US" sz="3600" dirty="0" err="1">
+                <a:solidFill>
+                  <a:srgbClr val="00B0F0"/>
+                </a:solidFill>
+                <a:latin typeface="Adobe Heiti Std R" pitchFamily="34" charset="-128"/>
+                <a:ea typeface="Adobe Heiti Std R" pitchFamily="34" charset="-128"/>
+              </a:rPr>
+              <a:t>em</a:t>
+            </a:r>
+            <a:r>
+              <a:rPr lang="en-US" sz="3600" dirty="0">
+                <a:solidFill>
+                  <a:srgbClr val="00B0F0"/>
+                </a:solidFill>
+                <a:latin typeface="Adobe Heiti Std R" pitchFamily="34" charset="-128"/>
+                <a:ea typeface="Adobe Heiti Std R" pitchFamily="34" charset="-128"/>
+              </a:rPr>
+              <a:t> </a:t>
+            </a:r>
+            <a:r>
+              <a:rPr lang="en-US" sz="3600" dirty="0" err="1">
+                <a:solidFill>
+                  <a:srgbClr val="00B0F0"/>
+                </a:solidFill>
+                <a:latin typeface="Adobe Heiti Std R" pitchFamily="34" charset="-128"/>
+                <a:ea typeface="Adobe Heiti Std R" pitchFamily="34" charset="-128"/>
+              </a:rPr>
+              <a:t>Javascript</a:t>
+            </a:r>
+            <a:r>
+              <a:rPr lang="en-US" sz="3600" dirty="0">
+                <a:solidFill>
+                  <a:srgbClr val="00B0F0"/>
+                </a:solidFill>
+                <a:latin typeface="Adobe Heiti Std R" pitchFamily="34" charset="-128"/>
+                <a:ea typeface="Adobe Heiti Std R" pitchFamily="34" charset="-128"/>
+              </a:rPr>
+              <a:t> </a:t>
+            </a:r>
+            <a:r>
+              <a:rPr lang="en-US" sz="3600" dirty="0" smtClean="0">
+                <a:solidFill>
+                  <a:srgbClr val="00B0F0"/>
+                </a:solidFill>
+                <a:latin typeface="Adobe Heiti Std R" pitchFamily="34" charset="-128"/>
+                <a:ea typeface="Adobe Heiti Std R" pitchFamily="34" charset="-128"/>
+              </a:rPr>
+              <a:t>(8)  </a:t>
+            </a:r>
+            <a:endParaRPr lang="en-US" sz="3600" dirty="0">
+              <a:solidFill>
+                <a:srgbClr val="00B0F0"/>
+              </a:solidFill>
+              <a:latin typeface="Adobe Heiti Std R" pitchFamily="34" charset="-128"/>
+              <a:ea typeface="Adobe Heiti Std R" pitchFamily="34" charset="-128"/>
+            </a:endParaRPr>
+          </a:p>
+        </p:txBody>
+      </p:sp>
+      <p:sp>
+        <p:nvSpPr>
+          <p:cNvPr id="8" name="Espaço Reservado para Número de Slide 7"/>
+          <p:cNvSpPr>
+            <a:spLocks noGrp="1"/>
+          </p:cNvSpPr>
+          <p:nvPr>
+            <p:ph type="sldNum" sz="quarter" idx="12"/>
+          </p:nvPr>
+        </p:nvSpPr>
+        <p:spPr>
+          <a:xfrm>
+            <a:off x="6789060" y="6435906"/>
+            <a:ext cx="2133600" cy="365125"/>
+          </a:xfrm>
+        </p:spPr>
+        <p:txBody>
+          <a:bodyPr/>
+          <a:lstStyle/>
+          <a:p>
+            <a:r>
+              <a:rPr lang="en-US" sz="1800" dirty="0" smtClean="0">
+                <a:solidFill>
+                  <a:schemeClr val="bg1"/>
+                </a:solidFill>
+              </a:rPr>
+              <a:t>57</a:t>
+            </a:r>
+            <a:endParaRPr lang="en-US" sz="1800" dirty="0">
+              <a:solidFill>
+                <a:schemeClr val="bg1"/>
+              </a:solidFill>
+            </a:endParaRPr>
+          </a:p>
+        </p:txBody>
+      </p:sp>
+      <p:pic>
+        <p:nvPicPr>
+          <p:cNvPr id="7" name="Imagem 6"/>
+          <p:cNvPicPr>
+            <a:picLocks noChangeAspect="1"/>
+          </p:cNvPicPr>
+          <p:nvPr/>
+        </p:nvPicPr>
+        <p:blipFill>
+          <a:blip r:embed="rId2">
+            <a:extLst>
+              <a:ext uri="{28A0092B-C50C-407E-A947-70E740481C1C}">
+                <a14:useLocalDpi xmlns:a14="http://schemas.microsoft.com/office/drawing/2010/main" val="0"/>
+              </a:ext>
+            </a:extLst>
+          </a:blip>
+          <a:stretch>
+            <a:fillRect/>
+          </a:stretch>
+        </p:blipFill>
+        <p:spPr>
+          <a:xfrm>
+            <a:off x="-1044624" y="937217"/>
+            <a:ext cx="11089232" cy="502920"/>
+          </a:xfrm>
+          <a:prstGeom prst="rect">
+            <a:avLst/>
+          </a:prstGeom>
+        </p:spPr>
+      </p:pic>
+      <p:pic>
+        <p:nvPicPr>
+          <p:cNvPr id="6" name="Imagem 5"/>
+          <p:cNvPicPr>
+            <a:picLocks noChangeAspect="1"/>
+          </p:cNvPicPr>
+          <p:nvPr/>
+        </p:nvPicPr>
+        <p:blipFill>
+          <a:blip r:embed="rId3" cstate="print">
+            <a:extLst>
+              <a:ext uri="{28A0092B-C50C-407E-A947-70E740481C1C}">
+                <a14:useLocalDpi xmlns:a14="http://schemas.microsoft.com/office/drawing/2010/main" val="0"/>
+              </a:ext>
+            </a:extLst>
+          </a:blip>
+          <a:stretch>
+            <a:fillRect/>
+          </a:stretch>
+        </p:blipFill>
+        <p:spPr>
+          <a:xfrm>
+            <a:off x="266653" y="107704"/>
+            <a:ext cx="560931" cy="762614"/>
+          </a:xfrm>
+          <a:prstGeom prst="rect">
+            <a:avLst/>
+          </a:prstGeom>
+        </p:spPr>
+      </p:pic>
+      <p:sp>
+        <p:nvSpPr>
+          <p:cNvPr id="3" name="Espaço Reservado para Conteúdo 2"/>
+          <p:cNvSpPr>
+            <a:spLocks noGrp="1"/>
+          </p:cNvSpPr>
+          <p:nvPr>
+            <p:ph idx="1"/>
+          </p:nvPr>
+        </p:nvSpPr>
+        <p:spPr/>
+        <p:txBody>
+          <a:bodyPr/>
+          <a:lstStyle/>
+          <a:p>
+            <a:endParaRPr lang="en-US" dirty="0" smtClean="0"/>
+          </a:p>
+          <a:p>
+            <a:endParaRPr lang="en-US" dirty="0"/>
+          </a:p>
+          <a:p>
+            <a:endParaRPr lang="en-US" dirty="0" smtClean="0"/>
+          </a:p>
+          <a:p>
+            <a:endParaRPr lang="en-US" dirty="0"/>
+          </a:p>
+          <a:p>
+            <a:endParaRPr lang="en-US" dirty="0" smtClean="0"/>
+          </a:p>
+        </p:txBody>
+      </p:sp>
+      <p:sp>
+        <p:nvSpPr>
+          <p:cNvPr id="5" name="CaixaDeTexto 4"/>
+          <p:cNvSpPr txBox="1"/>
+          <p:nvPr/>
+        </p:nvSpPr>
+        <p:spPr>
+          <a:xfrm>
+            <a:off x="266653" y="1289336"/>
+            <a:ext cx="8420147" cy="461665"/>
+          </a:xfrm>
+          <a:prstGeom prst="rect">
+            <a:avLst/>
+          </a:prstGeom>
+          <a:noFill/>
+        </p:spPr>
+        <p:txBody>
+          <a:bodyPr wrap="square" rtlCol="0">
+            <a:spAutoFit/>
+          </a:bodyPr>
+          <a:lstStyle/>
+          <a:p>
+            <a:pPr algn="ctr"/>
+            <a:r>
+              <a:rPr lang="en-US" sz="2400" b="1" dirty="0" smtClean="0"/>
+              <a:t>PROGRAMAÇÃO BASEADA EM PROTÓTIPOS</a:t>
+            </a:r>
+            <a:endParaRPr lang="pt-BR" sz="2400" b="1" dirty="0"/>
+          </a:p>
+        </p:txBody>
+      </p:sp>
+      <p:sp>
+        <p:nvSpPr>
+          <p:cNvPr id="10" name="CaixaDeTexto 9"/>
+          <p:cNvSpPr txBox="1"/>
+          <p:nvPr/>
+        </p:nvSpPr>
+        <p:spPr>
+          <a:xfrm>
+            <a:off x="107505" y="5733767"/>
+            <a:ext cx="6912768" cy="523220"/>
+          </a:xfrm>
+          <a:prstGeom prst="rect">
+            <a:avLst/>
+          </a:prstGeom>
+          <a:noFill/>
+        </p:spPr>
+        <p:txBody>
+          <a:bodyPr wrap="square" rtlCol="0">
+            <a:spAutoFit/>
+          </a:bodyPr>
+          <a:lstStyle/>
+          <a:p>
+            <a:r>
+              <a:rPr lang="en-US" sz="2800" dirty="0" err="1" smtClean="0"/>
+              <a:t>Qual</a:t>
+            </a:r>
+            <a:r>
+              <a:rPr lang="en-US" sz="2800" dirty="0" smtClean="0"/>
+              <a:t> </a:t>
+            </a:r>
+            <a:r>
+              <a:rPr lang="en-US" sz="2800" dirty="0" err="1" smtClean="0"/>
+              <a:t>será</a:t>
+            </a:r>
+            <a:r>
+              <a:rPr lang="en-US" sz="2800" dirty="0" smtClean="0"/>
+              <a:t> o </a:t>
+            </a:r>
+            <a:r>
+              <a:rPr lang="en-US" sz="2800" dirty="0" err="1" smtClean="0"/>
+              <a:t>resultado</a:t>
+            </a:r>
+            <a:r>
+              <a:rPr lang="en-US" sz="2800" dirty="0" smtClean="0"/>
+              <a:t>?</a:t>
+            </a:r>
+            <a:endParaRPr lang="pt-BR" sz="2800" dirty="0"/>
+          </a:p>
+        </p:txBody>
+      </p:sp>
+      <p:pic>
+        <p:nvPicPr>
+          <p:cNvPr id="9" name="Imagem 8"/>
+          <p:cNvPicPr>
+            <a:picLocks noChangeAspect="1"/>
+          </p:cNvPicPr>
+          <p:nvPr/>
+        </p:nvPicPr>
+        <p:blipFill>
+          <a:blip r:embed="rId4"/>
+          <a:stretch>
+            <a:fillRect/>
+          </a:stretch>
+        </p:blipFill>
+        <p:spPr>
+          <a:xfrm>
+            <a:off x="1524294" y="1731024"/>
+            <a:ext cx="5488834" cy="3784334"/>
+          </a:xfrm>
+          <a:prstGeom prst="rect">
+            <a:avLst/>
+          </a:prstGeom>
+        </p:spPr>
+      </p:pic>
+    </p:spTree>
+    <p:extLst>
+      <p:ext uri="{BB962C8B-B14F-4D97-AF65-F5344CB8AC3E}">
+        <p14:creationId xmlns:p14="http://schemas.microsoft.com/office/powerpoint/2010/main" val="2494003433"/>
+      </p:ext>
+    </p:extLst>
+  </p:cSld>
+  <p:clrMapOvr>
+    <a:masterClrMapping/>
+  </p:clrMapOvr>
+  <p:transition spd="slow"/>
+  <p:timing>
+    <p:tnLst>
+      <p:par>
+        <p:cTn id="1" dur="indefinite" restart="never" nodeType="tmRoot"/>
+      </p:par>
+    </p:tnLst>
+  </p:timing>
+</p:sld>
+</file>
+
+<file path=ppt/slides/slide59.xml><?xml version="1.0" encoding="utf-8"?>
+<p:sld xmlns:a="http://schemas.openxmlformats.org/drawingml/2006/main" xmlns:r="http://schemas.openxmlformats.org/officeDocument/2006/relationships" xmlns:p="http://schemas.openxmlformats.org/presentationml/2006/main">
+  <p:cSld>
+    <p:spTree>
+      <p:nvGrpSpPr>
+        <p:cNvPr id="1" name=""/>
+        <p:cNvGrpSpPr/>
+        <p:nvPr/>
+      </p:nvGrpSpPr>
+      <p:grpSpPr>
+        <a:xfrm>
+          <a:off x="0" y="0"/>
+          <a:ext cx="0" cy="0"/>
+          <a:chOff x="0" y="0"/>
+          <a:chExt cx="0" cy="0"/>
+        </a:xfrm>
+      </p:grpSpPr>
+      <p:sp>
+        <p:nvSpPr>
+          <p:cNvPr id="2" name="Title 1"/>
+          <p:cNvSpPr>
+            <a:spLocks noGrp="1"/>
+          </p:cNvSpPr>
+          <p:nvPr>
+            <p:ph type="title"/>
+          </p:nvPr>
+        </p:nvSpPr>
+        <p:spPr>
+          <a:xfrm>
+            <a:off x="107505" y="-237135"/>
+            <a:ext cx="8894452" cy="914400"/>
+          </a:xfrm>
+        </p:spPr>
+        <p:txBody>
+          <a:bodyPr>
+            <a:normAutofit/>
+          </a:bodyPr>
+          <a:lstStyle/>
+          <a:p>
+            <a:r>
+              <a:rPr lang="en-US" sz="3600" dirty="0" err="1">
+                <a:solidFill>
+                  <a:srgbClr val="00B0F0"/>
+                </a:solidFill>
+                <a:latin typeface="Adobe Heiti Std R" pitchFamily="34" charset="-128"/>
+                <a:ea typeface="Adobe Heiti Std R" pitchFamily="34" charset="-128"/>
+              </a:rPr>
+              <a:t>Herança</a:t>
+            </a:r>
+            <a:r>
+              <a:rPr lang="en-US" sz="3600" dirty="0">
+                <a:solidFill>
+                  <a:srgbClr val="00B0F0"/>
+                </a:solidFill>
+                <a:latin typeface="Adobe Heiti Std R" pitchFamily="34" charset="-128"/>
+                <a:ea typeface="Adobe Heiti Std R" pitchFamily="34" charset="-128"/>
+              </a:rPr>
+              <a:t> </a:t>
+            </a:r>
+            <a:r>
+              <a:rPr lang="en-US" sz="3600" dirty="0" err="1">
+                <a:solidFill>
+                  <a:srgbClr val="00B0F0"/>
+                </a:solidFill>
+                <a:latin typeface="Adobe Heiti Std R" pitchFamily="34" charset="-128"/>
+                <a:ea typeface="Adobe Heiti Std R" pitchFamily="34" charset="-128"/>
+              </a:rPr>
+              <a:t>em</a:t>
+            </a:r>
+            <a:r>
+              <a:rPr lang="en-US" sz="3600" dirty="0">
+                <a:solidFill>
+                  <a:srgbClr val="00B0F0"/>
+                </a:solidFill>
+                <a:latin typeface="Adobe Heiti Std R" pitchFamily="34" charset="-128"/>
+                <a:ea typeface="Adobe Heiti Std R" pitchFamily="34" charset="-128"/>
+              </a:rPr>
+              <a:t> </a:t>
+            </a:r>
+            <a:r>
+              <a:rPr lang="en-US" sz="3600" dirty="0" err="1">
+                <a:solidFill>
+                  <a:srgbClr val="00B0F0"/>
+                </a:solidFill>
+                <a:latin typeface="Adobe Heiti Std R" pitchFamily="34" charset="-128"/>
+                <a:ea typeface="Adobe Heiti Std R" pitchFamily="34" charset="-128"/>
+              </a:rPr>
+              <a:t>Javascript</a:t>
+            </a:r>
+            <a:r>
+              <a:rPr lang="en-US" sz="3600" dirty="0">
+                <a:solidFill>
+                  <a:srgbClr val="00B0F0"/>
+                </a:solidFill>
+                <a:latin typeface="Adobe Heiti Std R" pitchFamily="34" charset="-128"/>
+                <a:ea typeface="Adobe Heiti Std R" pitchFamily="34" charset="-128"/>
+              </a:rPr>
+              <a:t> </a:t>
+            </a:r>
+            <a:r>
+              <a:rPr lang="en-US" sz="3600" dirty="0" smtClean="0">
+                <a:solidFill>
+                  <a:srgbClr val="00B0F0"/>
+                </a:solidFill>
+                <a:latin typeface="Adobe Heiti Std R" pitchFamily="34" charset="-128"/>
+                <a:ea typeface="Adobe Heiti Std R" pitchFamily="34" charset="-128"/>
+              </a:rPr>
+              <a:t>(9)  </a:t>
+            </a:r>
+            <a:endParaRPr lang="en-US" sz="3600" dirty="0">
+              <a:solidFill>
+                <a:srgbClr val="00B0F0"/>
+              </a:solidFill>
+              <a:latin typeface="Adobe Heiti Std R" pitchFamily="34" charset="-128"/>
+              <a:ea typeface="Adobe Heiti Std R" pitchFamily="34" charset="-128"/>
+            </a:endParaRPr>
+          </a:p>
+        </p:txBody>
+      </p:sp>
+      <p:sp>
+        <p:nvSpPr>
+          <p:cNvPr id="8" name="Espaço Reservado para Número de Slide 7"/>
+          <p:cNvSpPr>
+            <a:spLocks noGrp="1"/>
+          </p:cNvSpPr>
+          <p:nvPr>
+            <p:ph type="sldNum" sz="quarter" idx="12"/>
+          </p:nvPr>
+        </p:nvSpPr>
+        <p:spPr>
+          <a:xfrm>
+            <a:off x="6789060" y="6435906"/>
+            <a:ext cx="2133600" cy="365125"/>
+          </a:xfrm>
+        </p:spPr>
+        <p:txBody>
+          <a:bodyPr/>
+          <a:lstStyle/>
+          <a:p>
+            <a:r>
+              <a:rPr lang="en-US" sz="1800" dirty="0" smtClean="0">
+                <a:solidFill>
+                  <a:schemeClr val="bg1"/>
+                </a:solidFill>
+              </a:rPr>
+              <a:t>58</a:t>
+            </a:r>
+            <a:endParaRPr lang="en-US" sz="1800" dirty="0">
+              <a:solidFill>
+                <a:schemeClr val="bg1"/>
+              </a:solidFill>
+            </a:endParaRPr>
+          </a:p>
+        </p:txBody>
+      </p:sp>
+      <p:pic>
+        <p:nvPicPr>
+          <p:cNvPr id="7" name="Imagem 6"/>
+          <p:cNvPicPr>
+            <a:picLocks noChangeAspect="1"/>
+          </p:cNvPicPr>
+          <p:nvPr/>
+        </p:nvPicPr>
+        <p:blipFill>
+          <a:blip r:embed="rId2">
+            <a:extLst>
+              <a:ext uri="{28A0092B-C50C-407E-A947-70E740481C1C}">
+                <a14:useLocalDpi xmlns:a14="http://schemas.microsoft.com/office/drawing/2010/main" val="0"/>
+              </a:ext>
+            </a:extLst>
+          </a:blip>
+          <a:stretch>
+            <a:fillRect/>
+          </a:stretch>
+        </p:blipFill>
+        <p:spPr>
+          <a:xfrm>
+            <a:off x="0" y="445497"/>
+            <a:ext cx="9684568" cy="502920"/>
+          </a:xfrm>
+          <a:prstGeom prst="rect">
+            <a:avLst/>
+          </a:prstGeom>
+        </p:spPr>
+      </p:pic>
+      <p:pic>
+        <p:nvPicPr>
+          <p:cNvPr id="6" name="Imagem 5"/>
+          <p:cNvPicPr>
+            <a:picLocks noChangeAspect="1"/>
+          </p:cNvPicPr>
+          <p:nvPr/>
+        </p:nvPicPr>
+        <p:blipFill>
+          <a:blip r:embed="rId3" cstate="print">
+            <a:extLst>
+              <a:ext uri="{28A0092B-C50C-407E-A947-70E740481C1C}">
+                <a14:useLocalDpi xmlns:a14="http://schemas.microsoft.com/office/drawing/2010/main" val="0"/>
+              </a:ext>
+            </a:extLst>
+          </a:blip>
+          <a:stretch>
+            <a:fillRect/>
+          </a:stretch>
+        </p:blipFill>
+        <p:spPr>
+          <a:xfrm>
+            <a:off x="266653" y="107704"/>
+            <a:ext cx="560931" cy="762614"/>
+          </a:xfrm>
+          <a:prstGeom prst="rect">
+            <a:avLst/>
+          </a:prstGeom>
+        </p:spPr>
+      </p:pic>
+      <p:sp>
+        <p:nvSpPr>
+          <p:cNvPr id="3" name="Espaço Reservado para Conteúdo 2"/>
+          <p:cNvSpPr>
+            <a:spLocks noGrp="1"/>
+          </p:cNvSpPr>
+          <p:nvPr>
+            <p:ph idx="1"/>
+          </p:nvPr>
+        </p:nvSpPr>
+        <p:spPr/>
+        <p:txBody>
+          <a:bodyPr/>
+          <a:lstStyle/>
+          <a:p>
+            <a:endParaRPr lang="en-US" dirty="0" smtClean="0"/>
+          </a:p>
+          <a:p>
+            <a:endParaRPr lang="en-US" dirty="0"/>
+          </a:p>
+          <a:p>
+            <a:endParaRPr lang="en-US" dirty="0" smtClean="0"/>
+          </a:p>
+          <a:p>
+            <a:endParaRPr lang="en-US" dirty="0"/>
+          </a:p>
+          <a:p>
+            <a:endParaRPr lang="en-US" dirty="0" smtClean="0"/>
+          </a:p>
+        </p:txBody>
+      </p:sp>
+      <p:sp>
+        <p:nvSpPr>
+          <p:cNvPr id="5" name="CaixaDeTexto 4"/>
+          <p:cNvSpPr txBox="1"/>
+          <p:nvPr/>
+        </p:nvSpPr>
+        <p:spPr>
+          <a:xfrm>
+            <a:off x="512785" y="756175"/>
+            <a:ext cx="8420147" cy="461665"/>
+          </a:xfrm>
+          <a:prstGeom prst="rect">
+            <a:avLst/>
+          </a:prstGeom>
+          <a:noFill/>
+        </p:spPr>
+        <p:txBody>
+          <a:bodyPr wrap="square" rtlCol="0">
+            <a:spAutoFit/>
+          </a:bodyPr>
+          <a:lstStyle/>
+          <a:p>
+            <a:pPr algn="ctr"/>
+            <a:r>
+              <a:rPr lang="en-US" sz="2400" b="1" dirty="0" smtClean="0"/>
+              <a:t>PROGRAMAÇÃO BASEADA EM PROTÓTIPOS</a:t>
+            </a:r>
+            <a:endParaRPr lang="pt-BR" sz="2400" b="1" dirty="0"/>
+          </a:p>
+        </p:txBody>
+      </p:sp>
+      <p:sp>
+        <p:nvSpPr>
+          <p:cNvPr id="10" name="CaixaDeTexto 9"/>
+          <p:cNvSpPr txBox="1"/>
+          <p:nvPr/>
+        </p:nvSpPr>
+        <p:spPr>
+          <a:xfrm>
+            <a:off x="107504" y="5733767"/>
+            <a:ext cx="9036495" cy="523220"/>
+          </a:xfrm>
+          <a:prstGeom prst="rect">
+            <a:avLst/>
+          </a:prstGeom>
+          <a:noFill/>
+        </p:spPr>
+        <p:txBody>
+          <a:bodyPr wrap="square" rtlCol="0">
+            <a:spAutoFit/>
+          </a:bodyPr>
+          <a:lstStyle/>
+          <a:p>
+            <a:r>
+              <a:rPr lang="en-US" sz="2800" dirty="0" err="1" smtClean="0"/>
+              <a:t>Qual</a:t>
+            </a:r>
+            <a:r>
+              <a:rPr lang="en-US" sz="2800" dirty="0" smtClean="0"/>
+              <a:t> </a:t>
+            </a:r>
+            <a:r>
+              <a:rPr lang="en-US" sz="2800" dirty="0" err="1" smtClean="0"/>
+              <a:t>será</a:t>
+            </a:r>
+            <a:r>
+              <a:rPr lang="en-US" sz="2800" dirty="0" smtClean="0"/>
+              <a:t> o </a:t>
+            </a:r>
+            <a:r>
+              <a:rPr lang="en-US" sz="2800" dirty="0" err="1" smtClean="0"/>
+              <a:t>resultado</a:t>
+            </a:r>
+            <a:r>
+              <a:rPr lang="en-US" sz="2800" dirty="0"/>
+              <a:t> </a:t>
+            </a:r>
+            <a:r>
+              <a:rPr lang="en-US" sz="2800" dirty="0" err="1" smtClean="0"/>
+              <a:t>emitido</a:t>
+            </a:r>
+            <a:r>
+              <a:rPr lang="en-US" sz="2800" dirty="0" smtClean="0"/>
+              <a:t> </a:t>
+            </a:r>
+            <a:r>
+              <a:rPr lang="en-US" sz="2800" dirty="0" err="1" smtClean="0"/>
+              <a:t>por</a:t>
+            </a:r>
+            <a:r>
+              <a:rPr lang="en-US" sz="2800" dirty="0" smtClean="0"/>
+              <a:t> </a:t>
+            </a:r>
+            <a:r>
+              <a:rPr lang="en-US" sz="2800" dirty="0" err="1" smtClean="0"/>
+              <a:t>cada</a:t>
+            </a:r>
+            <a:r>
+              <a:rPr lang="en-US" sz="2800" dirty="0" smtClean="0"/>
+              <a:t> alert? </a:t>
+            </a:r>
+            <a:endParaRPr lang="pt-BR" sz="2800" dirty="0"/>
+          </a:p>
+        </p:txBody>
+      </p:sp>
+      <p:pic>
+        <p:nvPicPr>
+          <p:cNvPr id="12" name="Imagem 11"/>
+          <p:cNvPicPr>
+            <a:picLocks noChangeAspect="1"/>
+          </p:cNvPicPr>
+          <p:nvPr/>
+        </p:nvPicPr>
+        <p:blipFill>
+          <a:blip r:embed="rId4"/>
+          <a:stretch>
+            <a:fillRect/>
+          </a:stretch>
+        </p:blipFill>
+        <p:spPr>
+          <a:xfrm>
+            <a:off x="1475656" y="1286210"/>
+            <a:ext cx="6336704" cy="4495828"/>
+          </a:xfrm>
+          <a:prstGeom prst="rect">
+            <a:avLst/>
+          </a:prstGeom>
+        </p:spPr>
+      </p:pic>
+    </p:spTree>
+    <p:extLst>
+      <p:ext uri="{BB962C8B-B14F-4D97-AF65-F5344CB8AC3E}">
+        <p14:creationId xmlns:p14="http://schemas.microsoft.com/office/powerpoint/2010/main" val="3721727234"/>
       </p:ext>
     </p:extLst>
   </p:cSld>
@@ -16113,6 +20312,418 @@
     <p:extLst>
       <p:ext uri="{BB962C8B-B14F-4D97-AF65-F5344CB8AC3E}">
         <p14:creationId xmlns:p14="http://schemas.microsoft.com/office/powerpoint/2010/main" val="2121495277"/>
+      </p:ext>
+    </p:extLst>
+  </p:cSld>
+  <p:clrMapOvr>
+    <a:masterClrMapping/>
+  </p:clrMapOvr>
+  <p:transition spd="slow"/>
+  <p:timing>
+    <p:tnLst>
+      <p:par>
+        <p:cTn id="1" dur="indefinite" restart="never" nodeType="tmRoot"/>
+      </p:par>
+    </p:tnLst>
+  </p:timing>
+</p:sld>
+</file>
+
+<file path=ppt/slides/slide60.xml><?xml version="1.0" encoding="utf-8"?>
+<p:sld xmlns:a="http://schemas.openxmlformats.org/drawingml/2006/main" xmlns:r="http://schemas.openxmlformats.org/officeDocument/2006/relationships" xmlns:p="http://schemas.openxmlformats.org/presentationml/2006/main">
+  <p:cSld>
+    <p:spTree>
+      <p:nvGrpSpPr>
+        <p:cNvPr id="1" name=""/>
+        <p:cNvGrpSpPr/>
+        <p:nvPr/>
+      </p:nvGrpSpPr>
+      <p:grpSpPr>
+        <a:xfrm>
+          <a:off x="0" y="0"/>
+          <a:ext cx="0" cy="0"/>
+          <a:chOff x="0" y="0"/>
+          <a:chExt cx="0" cy="0"/>
+        </a:xfrm>
+      </p:grpSpPr>
+      <p:sp>
+        <p:nvSpPr>
+          <p:cNvPr id="2" name="Title 1"/>
+          <p:cNvSpPr>
+            <a:spLocks noGrp="1"/>
+          </p:cNvSpPr>
+          <p:nvPr>
+            <p:ph type="title"/>
+          </p:nvPr>
+        </p:nvSpPr>
+        <p:spPr>
+          <a:xfrm>
+            <a:off x="107505" y="-237135"/>
+            <a:ext cx="8894452" cy="914400"/>
+          </a:xfrm>
+        </p:spPr>
+        <p:txBody>
+          <a:bodyPr>
+            <a:normAutofit/>
+          </a:bodyPr>
+          <a:lstStyle/>
+          <a:p>
+            <a:r>
+              <a:rPr lang="en-US" sz="3600" dirty="0" err="1">
+                <a:solidFill>
+                  <a:srgbClr val="00B0F0"/>
+                </a:solidFill>
+                <a:latin typeface="Adobe Heiti Std R" pitchFamily="34" charset="-128"/>
+                <a:ea typeface="Adobe Heiti Std R" pitchFamily="34" charset="-128"/>
+              </a:rPr>
+              <a:t>Herança</a:t>
+            </a:r>
+            <a:r>
+              <a:rPr lang="en-US" sz="3600" dirty="0">
+                <a:solidFill>
+                  <a:srgbClr val="00B0F0"/>
+                </a:solidFill>
+                <a:latin typeface="Adobe Heiti Std R" pitchFamily="34" charset="-128"/>
+                <a:ea typeface="Adobe Heiti Std R" pitchFamily="34" charset="-128"/>
+              </a:rPr>
+              <a:t> </a:t>
+            </a:r>
+            <a:r>
+              <a:rPr lang="en-US" sz="3600" dirty="0" err="1">
+                <a:solidFill>
+                  <a:srgbClr val="00B0F0"/>
+                </a:solidFill>
+                <a:latin typeface="Adobe Heiti Std R" pitchFamily="34" charset="-128"/>
+                <a:ea typeface="Adobe Heiti Std R" pitchFamily="34" charset="-128"/>
+              </a:rPr>
+              <a:t>em</a:t>
+            </a:r>
+            <a:r>
+              <a:rPr lang="en-US" sz="3600" dirty="0">
+                <a:solidFill>
+                  <a:srgbClr val="00B0F0"/>
+                </a:solidFill>
+                <a:latin typeface="Adobe Heiti Std R" pitchFamily="34" charset="-128"/>
+                <a:ea typeface="Adobe Heiti Std R" pitchFamily="34" charset="-128"/>
+              </a:rPr>
+              <a:t> </a:t>
+            </a:r>
+            <a:r>
+              <a:rPr lang="en-US" sz="3600" dirty="0" err="1">
+                <a:solidFill>
+                  <a:srgbClr val="00B0F0"/>
+                </a:solidFill>
+                <a:latin typeface="Adobe Heiti Std R" pitchFamily="34" charset="-128"/>
+                <a:ea typeface="Adobe Heiti Std R" pitchFamily="34" charset="-128"/>
+              </a:rPr>
+              <a:t>Javascript</a:t>
+            </a:r>
+            <a:r>
+              <a:rPr lang="en-US" sz="3600" dirty="0">
+                <a:solidFill>
+                  <a:srgbClr val="00B0F0"/>
+                </a:solidFill>
+                <a:latin typeface="Adobe Heiti Std R" pitchFamily="34" charset="-128"/>
+                <a:ea typeface="Adobe Heiti Std R" pitchFamily="34" charset="-128"/>
+              </a:rPr>
+              <a:t> </a:t>
+            </a:r>
+            <a:r>
+              <a:rPr lang="en-US" sz="3600" dirty="0" smtClean="0">
+                <a:solidFill>
+                  <a:srgbClr val="00B0F0"/>
+                </a:solidFill>
+                <a:latin typeface="Adobe Heiti Std R" pitchFamily="34" charset="-128"/>
+                <a:ea typeface="Adobe Heiti Std R" pitchFamily="34" charset="-128"/>
+              </a:rPr>
+              <a:t>(10)  </a:t>
+            </a:r>
+            <a:endParaRPr lang="en-US" sz="3600" dirty="0">
+              <a:solidFill>
+                <a:srgbClr val="00B0F0"/>
+              </a:solidFill>
+              <a:latin typeface="Adobe Heiti Std R" pitchFamily="34" charset="-128"/>
+              <a:ea typeface="Adobe Heiti Std R" pitchFamily="34" charset="-128"/>
+            </a:endParaRPr>
+          </a:p>
+        </p:txBody>
+      </p:sp>
+      <p:sp>
+        <p:nvSpPr>
+          <p:cNvPr id="8" name="Espaço Reservado para Número de Slide 7"/>
+          <p:cNvSpPr>
+            <a:spLocks noGrp="1"/>
+          </p:cNvSpPr>
+          <p:nvPr>
+            <p:ph type="sldNum" sz="quarter" idx="12"/>
+          </p:nvPr>
+        </p:nvSpPr>
+        <p:spPr>
+          <a:xfrm>
+            <a:off x="6789060" y="6435906"/>
+            <a:ext cx="2133600" cy="365125"/>
+          </a:xfrm>
+        </p:spPr>
+        <p:txBody>
+          <a:bodyPr/>
+          <a:lstStyle/>
+          <a:p>
+            <a:r>
+              <a:rPr lang="en-US" sz="1800" dirty="0" smtClean="0">
+                <a:solidFill>
+                  <a:schemeClr val="bg1"/>
+                </a:solidFill>
+              </a:rPr>
+              <a:t>59</a:t>
+            </a:r>
+            <a:endParaRPr lang="en-US" sz="1800" dirty="0">
+              <a:solidFill>
+                <a:schemeClr val="bg1"/>
+              </a:solidFill>
+            </a:endParaRPr>
+          </a:p>
+        </p:txBody>
+      </p:sp>
+      <p:pic>
+        <p:nvPicPr>
+          <p:cNvPr id="7" name="Imagem 6"/>
+          <p:cNvPicPr>
+            <a:picLocks noChangeAspect="1"/>
+          </p:cNvPicPr>
+          <p:nvPr/>
+        </p:nvPicPr>
+        <p:blipFill>
+          <a:blip r:embed="rId2">
+            <a:extLst>
+              <a:ext uri="{28A0092B-C50C-407E-A947-70E740481C1C}">
+                <a14:useLocalDpi xmlns:a14="http://schemas.microsoft.com/office/drawing/2010/main" val="0"/>
+              </a:ext>
+            </a:extLst>
+          </a:blip>
+          <a:stretch>
+            <a:fillRect/>
+          </a:stretch>
+        </p:blipFill>
+        <p:spPr>
+          <a:xfrm>
+            <a:off x="0" y="445497"/>
+            <a:ext cx="9684568" cy="502920"/>
+          </a:xfrm>
+          <a:prstGeom prst="rect">
+            <a:avLst/>
+          </a:prstGeom>
+        </p:spPr>
+      </p:pic>
+      <p:pic>
+        <p:nvPicPr>
+          <p:cNvPr id="6" name="Imagem 5"/>
+          <p:cNvPicPr>
+            <a:picLocks noChangeAspect="1"/>
+          </p:cNvPicPr>
+          <p:nvPr/>
+        </p:nvPicPr>
+        <p:blipFill>
+          <a:blip r:embed="rId3" cstate="print">
+            <a:extLst>
+              <a:ext uri="{28A0092B-C50C-407E-A947-70E740481C1C}">
+                <a14:useLocalDpi xmlns:a14="http://schemas.microsoft.com/office/drawing/2010/main" val="0"/>
+              </a:ext>
+            </a:extLst>
+          </a:blip>
+          <a:stretch>
+            <a:fillRect/>
+          </a:stretch>
+        </p:blipFill>
+        <p:spPr>
+          <a:xfrm>
+            <a:off x="266653" y="107704"/>
+            <a:ext cx="560931" cy="762614"/>
+          </a:xfrm>
+          <a:prstGeom prst="rect">
+            <a:avLst/>
+          </a:prstGeom>
+        </p:spPr>
+      </p:pic>
+      <p:sp>
+        <p:nvSpPr>
+          <p:cNvPr id="3" name="Espaço Reservado para Conteúdo 2"/>
+          <p:cNvSpPr>
+            <a:spLocks noGrp="1"/>
+          </p:cNvSpPr>
+          <p:nvPr>
+            <p:ph idx="1"/>
+          </p:nvPr>
+        </p:nvSpPr>
+        <p:spPr/>
+        <p:txBody>
+          <a:bodyPr/>
+          <a:lstStyle/>
+          <a:p>
+            <a:endParaRPr lang="en-US" dirty="0" smtClean="0"/>
+          </a:p>
+          <a:p>
+            <a:endParaRPr lang="en-US" dirty="0"/>
+          </a:p>
+          <a:p>
+            <a:endParaRPr lang="en-US" dirty="0" smtClean="0"/>
+          </a:p>
+          <a:p>
+            <a:endParaRPr lang="en-US" dirty="0"/>
+          </a:p>
+          <a:p>
+            <a:endParaRPr lang="en-US" dirty="0" smtClean="0"/>
+          </a:p>
+        </p:txBody>
+      </p:sp>
+      <p:sp>
+        <p:nvSpPr>
+          <p:cNvPr id="5" name="CaixaDeTexto 4"/>
+          <p:cNvSpPr txBox="1"/>
+          <p:nvPr/>
+        </p:nvSpPr>
+        <p:spPr>
+          <a:xfrm>
+            <a:off x="512785" y="756175"/>
+            <a:ext cx="8420147" cy="461665"/>
+          </a:xfrm>
+          <a:prstGeom prst="rect">
+            <a:avLst/>
+          </a:prstGeom>
+          <a:noFill/>
+        </p:spPr>
+        <p:txBody>
+          <a:bodyPr wrap="square" rtlCol="0">
+            <a:spAutoFit/>
+          </a:bodyPr>
+          <a:lstStyle/>
+          <a:p>
+            <a:pPr algn="ctr"/>
+            <a:r>
+              <a:rPr lang="en-US" sz="2400" b="1" dirty="0" smtClean="0"/>
+              <a:t>PROGRAMAÇÃO BASEADA EM PROTÓTIPOS</a:t>
+            </a:r>
+            <a:endParaRPr lang="pt-BR" sz="2400" b="1" dirty="0"/>
+          </a:p>
+        </p:txBody>
+      </p:sp>
+      <p:sp>
+        <p:nvSpPr>
+          <p:cNvPr id="10" name="CaixaDeTexto 9"/>
+          <p:cNvSpPr txBox="1"/>
+          <p:nvPr/>
+        </p:nvSpPr>
+        <p:spPr>
+          <a:xfrm>
+            <a:off x="107504" y="5733767"/>
+            <a:ext cx="9036495" cy="523220"/>
+          </a:xfrm>
+          <a:prstGeom prst="rect">
+            <a:avLst/>
+          </a:prstGeom>
+          <a:noFill/>
+        </p:spPr>
+        <p:txBody>
+          <a:bodyPr wrap="square" rtlCol="0">
+            <a:spAutoFit/>
+          </a:bodyPr>
+          <a:lstStyle/>
+          <a:p>
+            <a:r>
+              <a:rPr lang="en-US" sz="2800" dirty="0" err="1" smtClean="0"/>
+              <a:t>Qual</a:t>
+            </a:r>
+            <a:r>
+              <a:rPr lang="en-US" sz="2800" dirty="0" smtClean="0"/>
+              <a:t> </a:t>
+            </a:r>
+            <a:r>
+              <a:rPr lang="en-US" sz="2800" dirty="0" err="1" smtClean="0"/>
+              <a:t>será</a:t>
+            </a:r>
+            <a:r>
+              <a:rPr lang="en-US" sz="2800" dirty="0" smtClean="0"/>
+              <a:t> o </a:t>
+            </a:r>
+            <a:r>
+              <a:rPr lang="en-US" sz="2800" dirty="0" err="1" smtClean="0"/>
+              <a:t>resultado</a:t>
+            </a:r>
+            <a:r>
+              <a:rPr lang="en-US" sz="2800" dirty="0" smtClean="0"/>
+              <a:t>? </a:t>
+            </a:r>
+            <a:r>
+              <a:rPr lang="en-US" sz="2800" dirty="0" err="1" smtClean="0"/>
+              <a:t>Diga</a:t>
+            </a:r>
+            <a:r>
+              <a:rPr lang="en-US" sz="2800" dirty="0" smtClean="0"/>
+              <a:t> </a:t>
+            </a:r>
+            <a:r>
+              <a:rPr lang="en-US" sz="2800" dirty="0" err="1" smtClean="0"/>
+              <a:t>qual</a:t>
+            </a:r>
+            <a:r>
+              <a:rPr lang="en-US" sz="2800" dirty="0" smtClean="0"/>
+              <a:t> a </a:t>
+            </a:r>
+            <a:r>
+              <a:rPr lang="en-US" sz="2800" dirty="0" err="1" smtClean="0"/>
+              <a:t>instância</a:t>
+            </a:r>
+            <a:r>
+              <a:rPr lang="en-US" sz="2800" dirty="0" smtClean="0"/>
+              <a:t> de </a:t>
+            </a:r>
+            <a:r>
+              <a:rPr lang="en-US" sz="2800" dirty="0" err="1" smtClean="0"/>
+              <a:t>cada</a:t>
+            </a:r>
+            <a:r>
+              <a:rPr lang="en-US" sz="2800" dirty="0" smtClean="0"/>
+              <a:t> </a:t>
+            </a:r>
+            <a:r>
+              <a:rPr lang="en-US" sz="2800" dirty="0" err="1" smtClean="0"/>
+              <a:t>objeto</a:t>
+            </a:r>
+            <a:r>
+              <a:rPr lang="en-US" sz="2800" dirty="0" smtClean="0"/>
+              <a:t>. </a:t>
+            </a:r>
+            <a:endParaRPr lang="pt-BR" sz="2800" dirty="0"/>
+          </a:p>
+        </p:txBody>
+      </p:sp>
+      <p:pic>
+        <p:nvPicPr>
+          <p:cNvPr id="11" name="Imagem 10"/>
+          <p:cNvPicPr>
+            <a:picLocks noChangeAspect="1"/>
+          </p:cNvPicPr>
+          <p:nvPr/>
+        </p:nvPicPr>
+        <p:blipFill>
+          <a:blip r:embed="rId4"/>
+          <a:stretch>
+            <a:fillRect/>
+          </a:stretch>
+        </p:blipFill>
+        <p:spPr>
+          <a:xfrm>
+            <a:off x="266653" y="1127336"/>
+            <a:ext cx="8735304" cy="4606432"/>
+          </a:xfrm>
+          <a:prstGeom prst="rect">
+            <a:avLst/>
+          </a:prstGeom>
+        </p:spPr>
+      </p:pic>
+    </p:spTree>
+    <p:extLst>
+      <p:ext uri="{BB962C8B-B14F-4D97-AF65-F5344CB8AC3E}">
+        <p14:creationId xmlns:p14="http://schemas.microsoft.com/office/powerpoint/2010/main" val="1391958504"/>
       </p:ext>
     </p:extLst>
   </p:cSld>

</xml_diff>